<commit_message>
delete two unnecessary slides
</commit_message>
<xml_diff>
--- a/classes/prog2019/Prog3-Lecture16.pptx
+++ b/classes/prog2019/Prog3-Lecture16.pptx
@@ -5,7 +5,7 @@
     <p:sldMasterId id="2147483648" r:id="rId1"/>
   </p:sldMasterIdLst>
   <p:notesMasterIdLst>
-    <p:notesMasterId r:id="rId48"/>
+    <p:notesMasterId r:id="rId46"/>
   </p:notesMasterIdLst>
   <p:sldIdLst>
     <p:sldId id="339" r:id="rId2"/>
@@ -30,30 +30,28 @@
     <p:sldId id="301" r:id="rId21"/>
     <p:sldId id="305" r:id="rId22"/>
     <p:sldId id="306" r:id="rId23"/>
-    <p:sldId id="337" r:id="rId24"/>
-    <p:sldId id="338" r:id="rId25"/>
-    <p:sldId id="310" r:id="rId26"/>
-    <p:sldId id="322" r:id="rId27"/>
-    <p:sldId id="324" r:id="rId28"/>
-    <p:sldId id="340" r:id="rId29"/>
-    <p:sldId id="341" r:id="rId30"/>
-    <p:sldId id="323" r:id="rId31"/>
-    <p:sldId id="273" r:id="rId32"/>
-    <p:sldId id="274" r:id="rId33"/>
-    <p:sldId id="275" r:id="rId34"/>
-    <p:sldId id="311" r:id="rId35"/>
-    <p:sldId id="312" r:id="rId36"/>
-    <p:sldId id="342" r:id="rId37"/>
-    <p:sldId id="343" r:id="rId38"/>
-    <p:sldId id="321" r:id="rId39"/>
-    <p:sldId id="313" r:id="rId40"/>
-    <p:sldId id="314" r:id="rId41"/>
-    <p:sldId id="315" r:id="rId42"/>
-    <p:sldId id="320" r:id="rId43"/>
-    <p:sldId id="318" r:id="rId44"/>
-    <p:sldId id="316" r:id="rId45"/>
-    <p:sldId id="319" r:id="rId46"/>
-    <p:sldId id="332" r:id="rId47"/>
+    <p:sldId id="310" r:id="rId24"/>
+    <p:sldId id="322" r:id="rId25"/>
+    <p:sldId id="324" r:id="rId26"/>
+    <p:sldId id="340" r:id="rId27"/>
+    <p:sldId id="341" r:id="rId28"/>
+    <p:sldId id="323" r:id="rId29"/>
+    <p:sldId id="273" r:id="rId30"/>
+    <p:sldId id="274" r:id="rId31"/>
+    <p:sldId id="275" r:id="rId32"/>
+    <p:sldId id="311" r:id="rId33"/>
+    <p:sldId id="312" r:id="rId34"/>
+    <p:sldId id="342" r:id="rId35"/>
+    <p:sldId id="343" r:id="rId36"/>
+    <p:sldId id="321" r:id="rId37"/>
+    <p:sldId id="313" r:id="rId38"/>
+    <p:sldId id="314" r:id="rId39"/>
+    <p:sldId id="315" r:id="rId40"/>
+    <p:sldId id="320" r:id="rId41"/>
+    <p:sldId id="318" r:id="rId42"/>
+    <p:sldId id="316" r:id="rId43"/>
+    <p:sldId id="319" r:id="rId44"/>
+    <p:sldId id="332" r:id="rId45"/>
   </p:sldIdLst>
   <p:sldSz cx="9144000" cy="6858000" type="screen4x3"/>
   <p:notesSz cx="6858000" cy="9144000"/>
@@ -171,10 +169,6 @@
 </p:presentation>
 </file>
 
-<file path=ppt/revisionInfo.xml><?xml version="1.0" encoding="utf-8"?>
-<p1510:revInfo xmlns:a="http://schemas.openxmlformats.org/drawingml/2006/main" xmlns:r="http://schemas.openxmlformats.org/officeDocument/2006/relationships" xmlns:p1510="http://schemas.microsoft.com/office/powerpoint/2015/10/main"/>
-</file>
-
 <file path=ppt/notesMasters/notesMaster1.xml><?xml version="1.0" encoding="utf-8"?>
 <p:notesMaster xmlns:a="http://schemas.openxmlformats.org/drawingml/2006/main" xmlns:r="http://schemas.openxmlformats.org/officeDocument/2006/relationships" xmlns:p="http://schemas.openxmlformats.org/presentationml/2006/main">
   <p:cSld>
@@ -258,7 +252,7 @@
             <a:fld id="{D58794C4-1EC2-4677-9397-D08FD83000DB}" type="datetimeFigureOut">
               <a:rPr lang="en-US" smtClean="0"/>
               <a:pPr/>
-              <a:t>11/6/2018</a:t>
+              <a:t>11/10/2019</a:t>
             </a:fld>
             <a:endParaRPr lang="en-US"/>
           </a:p>
@@ -683,7 +677,7 @@
             <a:fld id="{CE8159C0-37C1-4059-BC61-1D860E37DACA}" type="slidenum">
               <a:rPr lang="en-US" smtClean="0"/>
               <a:pPr/>
-              <a:t>31</a:t>
+              <a:t>29</a:t>
             </a:fld>
             <a:endParaRPr lang="en-US"/>
           </a:p>
@@ -770,7 +764,7 @@
             <a:fld id="{CE8159C0-37C1-4059-BC61-1D860E37DACA}" type="slidenum">
               <a:rPr lang="en-US" smtClean="0"/>
               <a:pPr/>
-              <a:t>32</a:t>
+              <a:t>30</a:t>
             </a:fld>
             <a:endParaRPr lang="en-US"/>
           </a:p>
@@ -857,7 +851,7 @@
             <a:fld id="{CE8159C0-37C1-4059-BC61-1D860E37DACA}" type="slidenum">
               <a:rPr lang="en-US" smtClean="0"/>
               <a:pPr/>
-              <a:t>33</a:t>
+              <a:t>31</a:t>
             </a:fld>
             <a:endParaRPr lang="en-US"/>
           </a:p>
@@ -1056,7 +1050,7 @@
             <a:fld id="{1D8BD707-D9CF-40AE-B4C6-C98DA3205C09}" type="datetimeFigureOut">
               <a:rPr lang="en-US" smtClean="0"/>
               <a:pPr/>
-              <a:t>11/6/2018</a:t>
+              <a:t>11/10/2019</a:t>
             </a:fld>
             <a:endParaRPr lang="en-US"/>
           </a:p>
@@ -1221,7 +1215,7 @@
             <a:fld id="{1D8BD707-D9CF-40AE-B4C6-C98DA3205C09}" type="datetimeFigureOut">
               <a:rPr lang="en-US" smtClean="0"/>
               <a:pPr/>
-              <a:t>11/6/2018</a:t>
+              <a:t>11/10/2019</a:t>
             </a:fld>
             <a:endParaRPr lang="en-US"/>
           </a:p>
@@ -1396,7 +1390,7 @@
             <a:fld id="{1D8BD707-D9CF-40AE-B4C6-C98DA3205C09}" type="datetimeFigureOut">
               <a:rPr lang="en-US" smtClean="0"/>
               <a:pPr/>
-              <a:t>11/6/2018</a:t>
+              <a:t>11/10/2019</a:t>
             </a:fld>
             <a:endParaRPr lang="en-US"/>
           </a:p>
@@ -1561,7 +1555,7 @@
             <a:fld id="{1D8BD707-D9CF-40AE-B4C6-C98DA3205C09}" type="datetimeFigureOut">
               <a:rPr lang="en-US" smtClean="0"/>
               <a:pPr/>
-              <a:t>11/6/2018</a:t>
+              <a:t>11/10/2019</a:t>
             </a:fld>
             <a:endParaRPr lang="en-US"/>
           </a:p>
@@ -1803,7 +1797,7 @@
             <a:fld id="{1D8BD707-D9CF-40AE-B4C6-C98DA3205C09}" type="datetimeFigureOut">
               <a:rPr lang="en-US" smtClean="0"/>
               <a:pPr/>
-              <a:t>11/6/2018</a:t>
+              <a:t>11/10/2019</a:t>
             </a:fld>
             <a:endParaRPr lang="en-US"/>
           </a:p>
@@ -2085,7 +2079,7 @@
             <a:fld id="{1D8BD707-D9CF-40AE-B4C6-C98DA3205C09}" type="datetimeFigureOut">
               <a:rPr lang="en-US" smtClean="0"/>
               <a:pPr/>
-              <a:t>11/6/2018</a:t>
+              <a:t>11/10/2019</a:t>
             </a:fld>
             <a:endParaRPr lang="en-US"/>
           </a:p>
@@ -2501,7 +2495,7 @@
             <a:fld id="{1D8BD707-D9CF-40AE-B4C6-C98DA3205C09}" type="datetimeFigureOut">
               <a:rPr lang="en-US" smtClean="0"/>
               <a:pPr/>
-              <a:t>11/6/2018</a:t>
+              <a:t>11/10/2019</a:t>
             </a:fld>
             <a:endParaRPr lang="en-US"/>
           </a:p>
@@ -2615,7 +2609,7 @@
             <a:fld id="{1D8BD707-D9CF-40AE-B4C6-C98DA3205C09}" type="datetimeFigureOut">
               <a:rPr lang="en-US" smtClean="0"/>
               <a:pPr/>
-              <a:t>11/6/2018</a:t>
+              <a:t>11/10/2019</a:t>
             </a:fld>
             <a:endParaRPr lang="en-US"/>
           </a:p>
@@ -2707,7 +2701,7 @@
             <a:fld id="{1D8BD707-D9CF-40AE-B4C6-C98DA3205C09}" type="datetimeFigureOut">
               <a:rPr lang="en-US" smtClean="0"/>
               <a:pPr/>
-              <a:t>11/6/2018</a:t>
+              <a:t>11/10/2019</a:t>
             </a:fld>
             <a:endParaRPr lang="en-US"/>
           </a:p>
@@ -2979,7 +2973,7 @@
             <a:fld id="{1D8BD707-D9CF-40AE-B4C6-C98DA3205C09}" type="datetimeFigureOut">
               <a:rPr lang="en-US" smtClean="0"/>
               <a:pPr/>
-              <a:t>11/6/2018</a:t>
+              <a:t>11/10/2019</a:t>
             </a:fld>
             <a:endParaRPr lang="en-US"/>
           </a:p>
@@ -3228,7 +3222,7 @@
             <a:fld id="{1D8BD707-D9CF-40AE-B4C6-C98DA3205C09}" type="datetimeFigureOut">
               <a:rPr lang="en-US" smtClean="0"/>
               <a:pPr/>
-              <a:t>11/6/2018</a:t>
+              <a:t>11/10/2019</a:t>
             </a:fld>
             <a:endParaRPr lang="en-US"/>
           </a:p>
@@ -3436,7 +3430,7 @@
             <a:fld id="{1D8BD707-D9CF-40AE-B4C6-C98DA3205C09}" type="datetimeFigureOut">
               <a:rPr lang="en-US" smtClean="0"/>
               <a:pPr/>
-              <a:t>11/6/2018</a:t>
+              <a:t>11/10/2019</a:t>
             </a:fld>
             <a:endParaRPr lang="en-US"/>
           </a:p>
@@ -3931,13 +3925,6 @@
   <p:clrMapOvr>
     <a:masterClrMapping/>
   </p:clrMapOvr>
-  <p:timing>
-    <p:tnLst>
-      <p:par>
-        <p:cTn id="1" dur="indefinite" restart="never" nodeType="tmRoot"/>
-      </p:par>
-    </p:tnLst>
-  </p:timing>
 </p:sld>
 </file>
 
@@ -4053,13 +4040,6 @@
   <p:clrMapOvr>
     <a:masterClrMapping/>
   </p:clrMapOvr>
-  <p:timing>
-    <p:tnLst>
-      <p:par>
-        <p:cTn id="1" dur="indefinite" restart="never" nodeType="tmRoot"/>
-      </p:par>
-    </p:tnLst>
-  </p:timing>
 </p:sld>
 </file>
 
@@ -4220,13 +4200,6 @@
   <p:clrMapOvr>
     <a:masterClrMapping/>
   </p:clrMapOvr>
-  <p:timing>
-    <p:tnLst>
-      <p:par>
-        <p:cTn id="1" dur="indefinite" restart="never" nodeType="tmRoot"/>
-      </p:par>
-    </p:tnLst>
-  </p:timing>
 </p:sld>
 </file>
 
@@ -4309,13 +4282,6 @@
   <p:clrMapOvr>
     <a:masterClrMapping/>
   </p:clrMapOvr>
-  <p:timing>
-    <p:tnLst>
-      <p:par>
-        <p:cTn id="1" dur="indefinite" restart="never" nodeType="tmRoot"/>
-      </p:par>
-    </p:tnLst>
-  </p:timing>
 </p:sld>
 </file>
 
@@ -4410,13 +4376,6 @@
   <p:clrMapOvr>
     <a:masterClrMapping/>
   </p:clrMapOvr>
-  <p:timing>
-    <p:tnLst>
-      <p:par>
-        <p:cTn id="1" dur="indefinite" restart="never" nodeType="tmRoot"/>
-      </p:par>
-    </p:tnLst>
-  </p:timing>
 </p:sld>
 </file>
 
@@ -4540,13 +4499,6 @@
   <p:clrMapOvr>
     <a:masterClrMapping/>
   </p:clrMapOvr>
-  <p:timing>
-    <p:tnLst>
-      <p:par>
-        <p:cTn id="1" dur="indefinite" restart="never" nodeType="tmRoot"/>
-      </p:par>
-    </p:tnLst>
-  </p:timing>
 </p:sld>
 </file>
 
@@ -4641,13 +4593,6 @@
   <p:clrMapOvr>
     <a:masterClrMapping/>
   </p:clrMapOvr>
-  <p:timing>
-    <p:tnLst>
-      <p:par>
-        <p:cTn id="1" dur="indefinite" restart="never" nodeType="tmRoot"/>
-      </p:par>
-    </p:tnLst>
-  </p:timing>
 </p:sld>
 </file>
 
@@ -4812,13 +4757,6 @@
   <p:clrMapOvr>
     <a:masterClrMapping/>
   </p:clrMapOvr>
-  <p:timing>
-    <p:tnLst>
-      <p:par>
-        <p:cTn id="1" dur="indefinite" restart="never" nodeType="tmRoot"/>
-      </p:par>
-    </p:tnLst>
-  </p:timing>
 </p:sld>
 </file>
 
@@ -4909,13 +4847,6 @@
   <p:clrMapOvr>
     <a:masterClrMapping/>
   </p:clrMapOvr>
-  <p:timing>
-    <p:tnLst>
-      <p:par>
-        <p:cTn id="1" dur="indefinite" restart="never" nodeType="tmRoot"/>
-      </p:par>
-    </p:tnLst>
-  </p:timing>
 </p:sld>
 </file>
 
@@ -5118,13 +5049,6 @@
   <p:clrMapOvr>
     <a:masterClrMapping/>
   </p:clrMapOvr>
-  <p:timing>
-    <p:tnLst>
-      <p:par>
-        <p:cTn id="1" dur="indefinite" restart="never" nodeType="tmRoot"/>
-      </p:par>
-    </p:tnLst>
-  </p:timing>
 </p:sld>
 </file>
 
@@ -5215,13 +5139,6 @@
   <p:clrMapOvr>
     <a:masterClrMapping/>
   </p:clrMapOvr>
-  <p:timing>
-    <p:tnLst>
-      <p:par>
-        <p:cTn id="1" dur="indefinite" restart="never" nodeType="tmRoot"/>
-      </p:par>
-    </p:tnLst>
-  </p:timing>
 </p:sld>
 </file>
 
@@ -5375,13 +5292,6 @@
   <p:clrMapOvr>
     <a:masterClrMapping/>
   </p:clrMapOvr>
-  <p:timing>
-    <p:tnLst>
-      <p:par>
-        <p:cTn id="1" dur="indefinite" restart="never" nodeType="tmRoot"/>
-      </p:par>
-    </p:tnLst>
-  </p:timing>
 </p:sld>
 </file>
 
@@ -5516,13 +5426,6 @@
   <p:clrMapOvr>
     <a:masterClrMapping/>
   </p:clrMapOvr>
-  <p:timing>
-    <p:tnLst>
-      <p:par>
-        <p:cTn id="1" dur="indefinite" restart="never" nodeType="tmRoot"/>
-      </p:par>
-    </p:tnLst>
-  </p:timing>
 </p:sld>
 </file>
 
@@ -5614,13 +5517,6 @@
   <p:clrMapOvr>
     <a:masterClrMapping/>
   </p:clrMapOvr>
-  <p:timing>
-    <p:tnLst>
-      <p:par>
-        <p:cTn id="1" dur="indefinite" restart="never" nodeType="tmRoot"/>
-      </p:par>
-    </p:tnLst>
-  </p:timing>
 </p:sld>
 </file>
 
@@ -5801,13 +5697,6 @@
   <p:clrMapOvr>
     <a:masterClrMapping/>
   </p:clrMapOvr>
-  <p:timing>
-    <p:tnLst>
-      <p:par>
-        <p:cTn id="1" dur="indefinite" restart="never" nodeType="tmRoot"/>
-      </p:par>
-    </p:tnLst>
-  </p:timing>
 </p:sld>
 </file>
 
@@ -5830,10 +5719,10 @@
       </p:grpSpPr>
       <p:sp>
         <p:nvSpPr>
-          <p:cNvPr id="4" name="TextBox 3">
+          <p:cNvPr id="6" name="TextBox 5">
             <a:extLst>
               <a:ext uri="{FF2B5EF4-FFF2-40B4-BE49-F238E27FC236}">
-                <a16:creationId xmlns:a16="http://schemas.microsoft.com/office/drawing/2014/main" id="{FB2B08F1-84D4-4D88-BE33-E2FD902FEE66}"/>
+                <a16:creationId xmlns:a16="http://schemas.microsoft.com/office/drawing/2014/main" id="{695A1E11-9C3A-4677-9FAE-D1043102F882}"/>
               </a:ext>
             </a:extLst>
           </p:cNvPr>
@@ -5842,8 +5731,8 @@
         </p:nvSpPr>
         <p:spPr>
           <a:xfrm>
-            <a:off x="457200" y="228600"/>
-            <a:ext cx="8077200" cy="369332"/>
+            <a:off x="381000" y="152400"/>
+            <a:ext cx="2783134" cy="2308324"/>
           </a:xfrm>
           <a:prstGeom prst="rect">
             <a:avLst/>
@@ -5851,129 +5740,102 @@
           <a:noFill/>
         </p:spPr>
         <p:txBody>
-          <a:bodyPr wrap="square" rtlCol="0">
+          <a:bodyPr wrap="none" rtlCol="0">
             <a:spAutoFit/>
           </a:bodyPr>
           <a:lstStyle/>
           <a:p>
             <a:r>
               <a:rPr lang="en-US" dirty="0"/>
-              <a:t>We can modify our one file at a time code to take a blocking queue </a:t>
-            </a:r>
-          </a:p>
-        </p:txBody>
-      </p:sp>
-      <p:pic>
-        <p:nvPicPr>
-          <p:cNvPr id="5" name="Picture 4">
+              <a:t>Semaphore</a:t>
+            </a:r>
+          </a:p>
+          <a:p>
+            <a:r>
+              <a:rPr lang="en-US" dirty="0" err="1"/>
+              <a:t>BlockingQueue</a:t>
+            </a:r>
+            <a:endParaRPr lang="en-US" dirty="0"/>
+          </a:p>
+          <a:p>
+            <a:r>
+              <a:rPr lang="en-US" dirty="0" err="1"/>
+              <a:t>CountDownLatch</a:t>
+            </a:r>
+            <a:endParaRPr lang="en-US" dirty="0"/>
+          </a:p>
+          <a:p>
+            <a:r>
+              <a:rPr lang="en-US" dirty="0"/>
+              <a:t>Callable, Future, </a:t>
+            </a:r>
+            <a:r>
+              <a:rPr lang="en-US" dirty="0" err="1"/>
+              <a:t>FutureTask</a:t>
+            </a:r>
+            <a:endParaRPr lang="en-US" dirty="0"/>
+          </a:p>
+          <a:p>
+            <a:r>
+              <a:rPr lang="en-US" dirty="0"/>
+              <a:t>Cancellation</a:t>
+            </a:r>
+          </a:p>
+          <a:p>
+            <a:endParaRPr lang="en-US" dirty="0"/>
+          </a:p>
+          <a:p>
+            <a:endParaRPr lang="en-US" dirty="0"/>
+          </a:p>
+          <a:p>
+            <a:endParaRPr lang="en-US" dirty="0"/>
+          </a:p>
+        </p:txBody>
+      </p:sp>
+      <p:cxnSp>
+        <p:nvCxnSpPr>
+          <p:cNvPr id="7" name="Straight Arrow Connector 6">
             <a:extLst>
               <a:ext uri="{FF2B5EF4-FFF2-40B4-BE49-F238E27FC236}">
-                <a16:creationId xmlns:a16="http://schemas.microsoft.com/office/drawing/2014/main" id="{5557069E-30AD-4829-AA23-AE0271A86648}"/>
+                <a16:creationId xmlns:a16="http://schemas.microsoft.com/office/drawing/2014/main" id="{A1704BF2-DD3A-48B2-B576-9E4265D0C4C5}"/>
               </a:ext>
             </a:extLst>
           </p:cNvPr>
-          <p:cNvPicPr>
-            <a:picLocks noChangeAspect="1"/>
-          </p:cNvPicPr>
-          <p:nvPr/>
-        </p:nvPicPr>
-        <p:blipFill>
-          <a:blip r:embed="rId2"/>
-          <a:stretch>
-            <a:fillRect/>
-          </a:stretch>
-        </p:blipFill>
-        <p:spPr>
-          <a:xfrm>
-            <a:off x="0" y="1524000"/>
-            <a:ext cx="9144000" cy="5115351"/>
-          </a:xfrm>
-          <a:prstGeom prst="rect">
-            <a:avLst/>
-          </a:prstGeom>
-        </p:spPr>
-      </p:pic>
-      <p:pic>
-        <p:nvPicPr>
-          <p:cNvPr id="6" name="Picture 5">
-            <a:extLst>
-              <a:ext uri="{FF2B5EF4-FFF2-40B4-BE49-F238E27FC236}">
-                <a16:creationId xmlns:a16="http://schemas.microsoft.com/office/drawing/2014/main" id="{74B21848-04A9-40DE-B7BC-9F232D6706CD}"/>
-              </a:ext>
-            </a:extLst>
-          </p:cNvPr>
-          <p:cNvPicPr>
-            <a:picLocks noChangeAspect="1"/>
-          </p:cNvPicPr>
-          <p:nvPr/>
-        </p:nvPicPr>
-        <p:blipFill>
-          <a:blip r:embed="rId3"/>
-          <a:stretch>
-            <a:fillRect/>
-          </a:stretch>
-        </p:blipFill>
-        <p:spPr>
-          <a:xfrm>
-            <a:off x="-14468" y="625254"/>
-            <a:ext cx="9144000" cy="709073"/>
-          </a:xfrm>
-          <a:prstGeom prst="rect">
-            <a:avLst/>
-          </a:prstGeom>
-        </p:spPr>
-      </p:pic>
-      <p:sp>
-        <p:nvSpPr>
-          <p:cNvPr id="2" name="Rectangle 1">
-            <a:extLst>
-              <a:ext uri="{FF2B5EF4-FFF2-40B4-BE49-F238E27FC236}">
-                <a16:creationId xmlns:a16="http://schemas.microsoft.com/office/drawing/2014/main" id="{B3F020B8-B45F-4A98-8093-E4042E3D046F}"/>
-              </a:ext>
-            </a:extLst>
-          </p:cNvPr>
-          <p:cNvSpPr/>
-          <p:nvPr/>
-        </p:nvSpPr>
-        <p:spPr>
-          <a:xfrm>
-            <a:off x="533400" y="6520190"/>
-            <a:ext cx="9296400" cy="261610"/>
-          </a:xfrm>
-          <a:prstGeom prst="rect">
-            <a:avLst/>
-          </a:prstGeom>
-        </p:spPr>
-        <p:txBody>
-          <a:bodyPr wrap="square">
-            <a:spAutoFit/>
-          </a:bodyPr>
-          <a:lstStyle/>
-          <a:p>
-            <a:r>
-              <a:rPr lang="en-US" sz="1100" dirty="0"/>
-              <a:t>https://github.com/afodor/metagenomicsTools/blob/master/src/classExamples/semaphoreAndBlockingQueues/GatherAllGCBlockingQueue.java</a:t>
-            </a:r>
-          </a:p>
-        </p:txBody>
-      </p:sp>
+          <p:cNvCxnSpPr/>
+          <p:nvPr/>
+        </p:nvCxnSpPr>
+        <p:spPr>
+          <a:xfrm rot="10800000">
+            <a:off x="2133600" y="912812"/>
+            <a:ext cx="533400" cy="1588"/>
+          </a:xfrm>
+          <a:prstGeom prst="straightConnector1">
+            <a:avLst/>
+          </a:prstGeom>
+          <a:ln>
+            <a:tailEnd type="arrow"/>
+          </a:ln>
+        </p:spPr>
+        <p:style>
+          <a:lnRef idx="1">
+            <a:schemeClr val="accent1"/>
+          </a:lnRef>
+          <a:fillRef idx="0">
+            <a:schemeClr val="accent1"/>
+          </a:fillRef>
+          <a:effectRef idx="0">
+            <a:schemeClr val="accent1"/>
+          </a:effectRef>
+          <a:fontRef idx="minor">
+            <a:schemeClr val="tx1"/>
+          </a:fontRef>
+        </p:style>
+      </p:cxnSp>
     </p:spTree>
-    <p:extLst>
-      <p:ext uri="{BB962C8B-B14F-4D97-AF65-F5344CB8AC3E}">
-        <p14:creationId xmlns:p14="http://schemas.microsoft.com/office/powerpoint/2010/main" val="987568899"/>
-      </p:ext>
-    </p:extLst>
   </p:cSld>
   <p:clrMapOvr>
     <a:masterClrMapping/>
   </p:clrMapOvr>
-  <p:timing>
-    <p:tnLst>
-      <p:par>
-        <p:cTn id="1" dur="indefinite" restart="never" nodeType="tmRoot"/>
-      </p:par>
-    </p:tnLst>
-  </p:timing>
 </p:sld>
 </file>
 
@@ -5994,15 +5856,73 @@
           <a:chExt cx="0" cy="0"/>
         </a:xfrm>
       </p:grpSpPr>
+      <p:sp>
+        <p:nvSpPr>
+          <p:cNvPr id="4" name="TextBox 3"/>
+          <p:cNvSpPr txBox="1"/>
+          <p:nvPr/>
+        </p:nvSpPr>
+        <p:spPr>
+          <a:xfrm>
+            <a:off x="457200" y="152400"/>
+            <a:ext cx="6964407" cy="1200329"/>
+          </a:xfrm>
+          <a:prstGeom prst="rect">
+            <a:avLst/>
+          </a:prstGeom>
+          <a:noFill/>
+        </p:spPr>
+        <p:txBody>
+          <a:bodyPr wrap="none" rtlCol="0">
+            <a:spAutoFit/>
+          </a:bodyPr>
+          <a:lstStyle/>
+          <a:p>
+            <a:r>
+              <a:rPr lang="en-US" dirty="0" err="1"/>
+              <a:t>CountDownLatch</a:t>
+            </a:r>
+            <a:r>
+              <a:rPr lang="en-US" dirty="0"/>
+              <a:t> is very useful (and easy to use)</a:t>
+            </a:r>
+          </a:p>
+          <a:p>
+            <a:endParaRPr lang="en-US" dirty="0"/>
+          </a:p>
+          <a:p>
+            <a:r>
+              <a:rPr lang="en-US" dirty="0"/>
+              <a:t>new </a:t>
+            </a:r>
+            <a:r>
+              <a:rPr lang="en-US" dirty="0" err="1"/>
+              <a:t>CountDownLatch</a:t>
+            </a:r>
+            <a:r>
+              <a:rPr lang="en-US" dirty="0"/>
+              <a:t>( … ) is called with the number of threads.</a:t>
+            </a:r>
+          </a:p>
+          <a:p>
+            <a:r>
+              <a:rPr lang="en-US" dirty="0"/>
+              <a:t>.await() blocks until .</a:t>
+            </a:r>
+            <a:r>
+              <a:rPr lang="en-US" dirty="0" err="1"/>
+              <a:t>countDown</a:t>
+            </a:r>
+            <a:r>
+              <a:rPr lang="en-US" dirty="0"/>
+              <a:t>() is called the correct number of times..</a:t>
+            </a:r>
+          </a:p>
+        </p:txBody>
+      </p:sp>
       <p:pic>
         <p:nvPicPr>
-          <p:cNvPr id="4" name="Picture 3">
-            <a:extLst>
-              <a:ext uri="{FF2B5EF4-FFF2-40B4-BE49-F238E27FC236}">
-                <a16:creationId xmlns:a16="http://schemas.microsoft.com/office/drawing/2014/main" id="{E1E98045-115E-43A7-A793-98070AAA78CA}"/>
-              </a:ext>
-            </a:extLst>
-          </p:cNvPr>
+          <p:cNvPr id="7" name="Picture 6"/>
           <p:cNvPicPr>
             <a:picLocks noChangeAspect="1"/>
           </p:cNvPicPr>
@@ -6016,8 +5936,8 @@
         </p:blipFill>
         <p:spPr>
           <a:xfrm>
-            <a:off x="0" y="304800"/>
-            <a:ext cx="9144000" cy="4871952"/>
+            <a:off x="228600" y="1752600"/>
+            <a:ext cx="8667750" cy="3209925"/>
           </a:xfrm>
           <a:prstGeom prst="rect">
             <a:avLst/>
@@ -6026,20 +5946,14 @@
       </p:pic>
       <p:sp>
         <p:nvSpPr>
-          <p:cNvPr id="5" name="TextBox 4">
-            <a:extLst>
-              <a:ext uri="{FF2B5EF4-FFF2-40B4-BE49-F238E27FC236}">
-                <a16:creationId xmlns:a16="http://schemas.microsoft.com/office/drawing/2014/main" id="{4C11C2C8-25EE-4B57-BF71-BD5F95845AF7}"/>
-              </a:ext>
-            </a:extLst>
-          </p:cNvPr>
+          <p:cNvPr id="8" name="TextBox 7"/>
           <p:cNvSpPr txBox="1"/>
           <p:nvPr/>
         </p:nvSpPr>
         <p:spPr>
           <a:xfrm>
-            <a:off x="685800" y="0"/>
-            <a:ext cx="6787436" cy="369332"/>
+            <a:off x="457200" y="5410200"/>
+            <a:ext cx="8225393" cy="646331"/>
           </a:xfrm>
           <a:prstGeom prst="rect">
             <a:avLst/>
@@ -6054,101 +5968,40 @@
           <a:p>
             <a:r>
               <a:rPr lang="en-US" dirty="0"/>
-              <a:t>Our main method now starts workers, who all share a </a:t>
+              <a:t>If you know you want x number of threads to run and then move on when they are all</a:t>
+            </a:r>
+          </a:p>
+          <a:p>
+            <a:r>
+              <a:rPr lang="en-US" dirty="0"/>
+              <a:t>done, the </a:t>
             </a:r>
             <a:r>
               <a:rPr lang="en-US" dirty="0" err="1"/>
-              <a:t>BlockingQueue</a:t>
+              <a:t>CountDownLatch</a:t>
             </a:r>
             <a:r>
               <a:rPr lang="en-US" dirty="0"/>
-              <a:t>…</a:t>
-            </a:r>
-          </a:p>
-        </p:txBody>
-      </p:sp>
-      <p:pic>
-        <p:nvPicPr>
-          <p:cNvPr id="6" name="Picture 5">
-            <a:extLst>
-              <a:ext uri="{FF2B5EF4-FFF2-40B4-BE49-F238E27FC236}">
-                <a16:creationId xmlns:a16="http://schemas.microsoft.com/office/drawing/2014/main" id="{9CE00E48-80CC-48DD-9A95-2CAE5517E38E}"/>
-              </a:ext>
-            </a:extLst>
-          </p:cNvPr>
-          <p:cNvPicPr>
-            <a:picLocks noChangeAspect="1"/>
-          </p:cNvPicPr>
-          <p:nvPr/>
-        </p:nvPicPr>
-        <p:blipFill>
-          <a:blip r:embed="rId3"/>
-          <a:stretch>
-            <a:fillRect/>
-          </a:stretch>
-        </p:blipFill>
-        <p:spPr>
-          <a:xfrm>
-            <a:off x="4267200" y="5810752"/>
-            <a:ext cx="4267200" cy="742448"/>
-          </a:xfrm>
-          <a:prstGeom prst="rect">
-            <a:avLst/>
-          </a:prstGeom>
-        </p:spPr>
-      </p:pic>
-      <p:sp>
-        <p:nvSpPr>
-          <p:cNvPr id="7" name="TextBox 6">
-            <a:extLst>
-              <a:ext uri="{FF2B5EF4-FFF2-40B4-BE49-F238E27FC236}">
-                <a16:creationId xmlns:a16="http://schemas.microsoft.com/office/drawing/2014/main" id="{649E89B8-15D5-4BE6-8DB4-9728588738FF}"/>
-              </a:ext>
-            </a:extLst>
-          </p:cNvPr>
-          <p:cNvSpPr txBox="1"/>
-          <p:nvPr/>
-        </p:nvSpPr>
-        <p:spPr>
-          <a:xfrm>
-            <a:off x="457200" y="5181600"/>
-            <a:ext cx="8167300" cy="369332"/>
-          </a:xfrm>
-          <a:prstGeom prst="rect">
-            <a:avLst/>
-          </a:prstGeom>
-          <a:noFill/>
-        </p:spPr>
-        <p:txBody>
-          <a:bodyPr wrap="none" rtlCol="0">
-            <a:spAutoFit/>
-          </a:bodyPr>
-          <a:lstStyle/>
-          <a:p>
-            <a:r>
-              <a:rPr lang="en-US" dirty="0"/>
-              <a:t>Not surprisingly, this yields about the same performance as our Semaphore solution..</a:t>
-            </a:r>
+              <a:t> </a:t>
+            </a:r>
+            <a:r>
+              <a:rPr lang="en-US"/>
+              <a:t>works nicely…</a:t>
+            </a:r>
+            <a:endParaRPr lang="en-US" dirty="0"/>
           </a:p>
         </p:txBody>
       </p:sp>
     </p:spTree>
     <p:extLst>
       <p:ext uri="{BB962C8B-B14F-4D97-AF65-F5344CB8AC3E}">
-        <p14:creationId xmlns:p14="http://schemas.microsoft.com/office/powerpoint/2010/main" val="2390356601"/>
+        <p14:creationId xmlns:p14="http://schemas.microsoft.com/office/powerpoint/2010/main" val="2055024068"/>
       </p:ext>
     </p:extLst>
   </p:cSld>
   <p:clrMapOvr>
     <a:masterClrMapping/>
   </p:clrMapOvr>
-  <p:timing>
-    <p:tnLst>
-      <p:par>
-        <p:cTn id="1" dur="indefinite" restart="never" nodeType="tmRoot"/>
-      </p:par>
-    </p:tnLst>
-  </p:timing>
 </p:sld>
 </file>
 
@@ -6171,20 +6024,14 @@
       </p:grpSpPr>
       <p:sp>
         <p:nvSpPr>
-          <p:cNvPr id="6" name="TextBox 5">
-            <a:extLst>
-              <a:ext uri="{FF2B5EF4-FFF2-40B4-BE49-F238E27FC236}">
-                <a16:creationId xmlns:a16="http://schemas.microsoft.com/office/drawing/2014/main" id="{695A1E11-9C3A-4677-9FAE-D1043102F882}"/>
-              </a:ext>
-            </a:extLst>
-          </p:cNvPr>
+          <p:cNvPr id="4" name="TextBox 3"/>
           <p:cNvSpPr txBox="1"/>
           <p:nvPr/>
         </p:nvSpPr>
         <p:spPr>
           <a:xfrm>
-            <a:off x="381000" y="152400"/>
-            <a:ext cx="2783134" cy="2308324"/>
+            <a:off x="76200" y="-76200"/>
+            <a:ext cx="6258765" cy="646331"/>
           </a:xfrm>
           <a:prstGeom prst="rect">
             <a:avLst/>
@@ -6199,102 +6046,83 @@
           <a:p>
             <a:r>
               <a:rPr lang="en-US" dirty="0"/>
-              <a:t>Semaphore</a:t>
-            </a:r>
-          </a:p>
-          <a:p>
-            <a:r>
-              <a:rPr lang="en-US" dirty="0" err="1"/>
-              <a:t>BlockingQueue</a:t>
-            </a:r>
-            <a:endParaRPr lang="en-US" dirty="0"/>
-          </a:p>
-          <a:p>
+              <a:t>We’ve already seen examples of </a:t>
+            </a:r>
             <a:r>
               <a:rPr lang="en-US" dirty="0" err="1"/>
               <a:t>CountDownLatch</a:t>
             </a:r>
-            <a:endParaRPr lang="en-US" dirty="0"/>
-          </a:p>
-          <a:p>
             <a:r>
               <a:rPr lang="en-US" dirty="0"/>
-              <a:t>Callable, Future, </a:t>
-            </a:r>
-            <a:r>
-              <a:rPr lang="en-US" dirty="0" err="1"/>
-              <a:t>FutureTask</a:t>
-            </a:r>
-            <a:endParaRPr lang="en-US" dirty="0"/>
+              <a:t> this semester..</a:t>
+            </a:r>
           </a:p>
           <a:p>
             <a:r>
               <a:rPr lang="en-US" dirty="0"/>
-              <a:t>Cancellation</a:t>
-            </a:r>
-          </a:p>
-          <a:p>
-            <a:endParaRPr lang="en-US" dirty="0"/>
-          </a:p>
-          <a:p>
-            <a:endParaRPr lang="en-US" dirty="0"/>
-          </a:p>
-          <a:p>
-            <a:endParaRPr lang="en-US" dirty="0"/>
-          </a:p>
-        </p:txBody>
-      </p:sp>
-      <p:cxnSp>
-        <p:nvCxnSpPr>
-          <p:cNvPr id="7" name="Straight Arrow Connector 6">
-            <a:extLst>
-              <a:ext uri="{FF2B5EF4-FFF2-40B4-BE49-F238E27FC236}">
-                <a16:creationId xmlns:a16="http://schemas.microsoft.com/office/drawing/2014/main" id="{A1704BF2-DD3A-48B2-B576-9E4265D0C4C5}"/>
-              </a:ext>
-            </a:extLst>
-          </p:cNvPr>
-          <p:cNvCxnSpPr/>
-          <p:nvPr/>
-        </p:nvCxnSpPr>
-        <p:spPr>
-          <a:xfrm rot="10800000">
-            <a:off x="2133600" y="912812"/>
-            <a:ext cx="533400" cy="1588"/>
-          </a:xfrm>
-          <a:prstGeom prst="straightConnector1">
-            <a:avLst/>
-          </a:prstGeom>
-          <a:ln>
-            <a:tailEnd type="arrow"/>
-          </a:ln>
-        </p:spPr>
-        <p:style>
-          <a:lnRef idx="1">
-            <a:schemeClr val="accent1"/>
-          </a:lnRef>
-          <a:fillRef idx="0">
-            <a:schemeClr val="accent1"/>
-          </a:fillRef>
-          <a:effectRef idx="0">
-            <a:schemeClr val="accent1"/>
-          </a:effectRef>
-          <a:fontRef idx="minor">
-            <a:schemeClr val="tx1"/>
-          </a:fontRef>
-        </p:style>
-      </p:cxnSp>
+              <a:t>Very useful and easy to use way to coral your threads…</a:t>
+            </a:r>
+          </a:p>
+        </p:txBody>
+      </p:sp>
+      <p:pic>
+        <p:nvPicPr>
+          <p:cNvPr id="6" name="Picture 5"/>
+          <p:cNvPicPr>
+            <a:picLocks noChangeAspect="1"/>
+          </p:cNvPicPr>
+          <p:nvPr/>
+        </p:nvPicPr>
+        <p:blipFill>
+          <a:blip r:embed="rId2"/>
+          <a:stretch>
+            <a:fillRect/>
+          </a:stretch>
+        </p:blipFill>
+        <p:spPr>
+          <a:xfrm>
+            <a:off x="238544" y="533400"/>
+            <a:ext cx="5934075" cy="6076950"/>
+          </a:xfrm>
+          <a:prstGeom prst="rect">
+            <a:avLst/>
+          </a:prstGeom>
+        </p:spPr>
+      </p:pic>
+      <p:pic>
+        <p:nvPicPr>
+          <p:cNvPr id="7" name="Picture 6"/>
+          <p:cNvPicPr>
+            <a:picLocks noChangeAspect="1"/>
+          </p:cNvPicPr>
+          <p:nvPr/>
+        </p:nvPicPr>
+        <p:blipFill>
+          <a:blip r:embed="rId3"/>
+          <a:stretch>
+            <a:fillRect/>
+          </a:stretch>
+        </p:blipFill>
+        <p:spPr>
+          <a:xfrm>
+            <a:off x="5486400" y="4267200"/>
+            <a:ext cx="2590800" cy="1209675"/>
+          </a:xfrm>
+          <a:prstGeom prst="rect">
+            <a:avLst/>
+          </a:prstGeom>
+        </p:spPr>
+      </p:pic>
     </p:spTree>
+    <p:extLst>
+      <p:ext uri="{BB962C8B-B14F-4D97-AF65-F5344CB8AC3E}">
+        <p14:creationId xmlns:p14="http://schemas.microsoft.com/office/powerpoint/2010/main" val="1150022246"/>
+      </p:ext>
+    </p:extLst>
   </p:cSld>
   <p:clrMapOvr>
     <a:masterClrMapping/>
   </p:clrMapOvr>
-  <p:timing>
-    <p:tnLst>
-      <p:par>
-        <p:cTn id="1" dur="indefinite" restart="never" nodeType="tmRoot"/>
-      </p:par>
-    </p:tnLst>
-  </p:timing>
 </p:sld>
 </file>
 
@@ -6317,307 +6145,6 @@
       </p:grpSpPr>
       <p:sp>
         <p:nvSpPr>
-          <p:cNvPr id="4" name="TextBox 3"/>
-          <p:cNvSpPr txBox="1"/>
-          <p:nvPr/>
-        </p:nvSpPr>
-        <p:spPr>
-          <a:xfrm>
-            <a:off x="457200" y="152400"/>
-            <a:ext cx="6964407" cy="1200329"/>
-          </a:xfrm>
-          <a:prstGeom prst="rect">
-            <a:avLst/>
-          </a:prstGeom>
-          <a:noFill/>
-        </p:spPr>
-        <p:txBody>
-          <a:bodyPr wrap="none" rtlCol="0">
-            <a:spAutoFit/>
-          </a:bodyPr>
-          <a:lstStyle/>
-          <a:p>
-            <a:r>
-              <a:rPr lang="en-US" dirty="0" err="1"/>
-              <a:t>CountDownLatch</a:t>
-            </a:r>
-            <a:r>
-              <a:rPr lang="en-US" dirty="0"/>
-              <a:t> is very useful (and easy to use)</a:t>
-            </a:r>
-          </a:p>
-          <a:p>
-            <a:endParaRPr lang="en-US" dirty="0"/>
-          </a:p>
-          <a:p>
-            <a:r>
-              <a:rPr lang="en-US" dirty="0"/>
-              <a:t>new </a:t>
-            </a:r>
-            <a:r>
-              <a:rPr lang="en-US" dirty="0" err="1"/>
-              <a:t>CountDownLatch</a:t>
-            </a:r>
-            <a:r>
-              <a:rPr lang="en-US" dirty="0"/>
-              <a:t>( … ) is called with the number of threads.</a:t>
-            </a:r>
-          </a:p>
-          <a:p>
-            <a:r>
-              <a:rPr lang="en-US" dirty="0"/>
-              <a:t>.await() blocks until .</a:t>
-            </a:r>
-            <a:r>
-              <a:rPr lang="en-US" dirty="0" err="1"/>
-              <a:t>countDown</a:t>
-            </a:r>
-            <a:r>
-              <a:rPr lang="en-US" dirty="0"/>
-              <a:t>() is called the correct number of times..</a:t>
-            </a:r>
-          </a:p>
-        </p:txBody>
-      </p:sp>
-      <p:pic>
-        <p:nvPicPr>
-          <p:cNvPr id="7" name="Picture 6"/>
-          <p:cNvPicPr>
-            <a:picLocks noChangeAspect="1"/>
-          </p:cNvPicPr>
-          <p:nvPr/>
-        </p:nvPicPr>
-        <p:blipFill>
-          <a:blip r:embed="rId2"/>
-          <a:stretch>
-            <a:fillRect/>
-          </a:stretch>
-        </p:blipFill>
-        <p:spPr>
-          <a:xfrm>
-            <a:off x="228600" y="1752600"/>
-            <a:ext cx="8667750" cy="3209925"/>
-          </a:xfrm>
-          <a:prstGeom prst="rect">
-            <a:avLst/>
-          </a:prstGeom>
-        </p:spPr>
-      </p:pic>
-      <p:sp>
-        <p:nvSpPr>
-          <p:cNvPr id="8" name="TextBox 7"/>
-          <p:cNvSpPr txBox="1"/>
-          <p:nvPr/>
-        </p:nvSpPr>
-        <p:spPr>
-          <a:xfrm>
-            <a:off x="457200" y="5410200"/>
-            <a:ext cx="8225393" cy="646331"/>
-          </a:xfrm>
-          <a:prstGeom prst="rect">
-            <a:avLst/>
-          </a:prstGeom>
-          <a:noFill/>
-        </p:spPr>
-        <p:txBody>
-          <a:bodyPr wrap="none" rtlCol="0">
-            <a:spAutoFit/>
-          </a:bodyPr>
-          <a:lstStyle/>
-          <a:p>
-            <a:r>
-              <a:rPr lang="en-US" dirty="0"/>
-              <a:t>If you know you want x number of threads to run and then move on when they are all</a:t>
-            </a:r>
-          </a:p>
-          <a:p>
-            <a:r>
-              <a:rPr lang="en-US" dirty="0"/>
-              <a:t>done, the </a:t>
-            </a:r>
-            <a:r>
-              <a:rPr lang="en-US" dirty="0" err="1"/>
-              <a:t>CountDownLatch</a:t>
-            </a:r>
-            <a:r>
-              <a:rPr lang="en-US" dirty="0"/>
-              <a:t> </a:t>
-            </a:r>
-            <a:r>
-              <a:rPr lang="en-US"/>
-              <a:t>works nicely…</a:t>
-            </a:r>
-            <a:endParaRPr lang="en-US" dirty="0"/>
-          </a:p>
-        </p:txBody>
-      </p:sp>
-    </p:spTree>
-    <p:extLst>
-      <p:ext uri="{BB962C8B-B14F-4D97-AF65-F5344CB8AC3E}">
-        <p14:creationId xmlns:p14="http://schemas.microsoft.com/office/powerpoint/2010/main" val="2055024068"/>
-      </p:ext>
-    </p:extLst>
-  </p:cSld>
-  <p:clrMapOvr>
-    <a:masterClrMapping/>
-  </p:clrMapOvr>
-  <p:timing>
-    <p:tnLst>
-      <p:par>
-        <p:cTn id="1" dur="indefinite" restart="never" nodeType="tmRoot"/>
-      </p:par>
-    </p:tnLst>
-  </p:timing>
-</p:sld>
-</file>
-
-<file path=ppt/slides/slide27.xml><?xml version="1.0" encoding="utf-8"?>
-<p:sld xmlns:a="http://schemas.openxmlformats.org/drawingml/2006/main" xmlns:r="http://schemas.openxmlformats.org/officeDocument/2006/relationships" xmlns:p="http://schemas.openxmlformats.org/presentationml/2006/main">
-  <p:cSld>
-    <p:spTree>
-      <p:nvGrpSpPr>
-        <p:cNvPr id="1" name=""/>
-        <p:cNvGrpSpPr/>
-        <p:nvPr/>
-      </p:nvGrpSpPr>
-      <p:grpSpPr>
-        <a:xfrm>
-          <a:off x="0" y="0"/>
-          <a:ext cx="0" cy="0"/>
-          <a:chOff x="0" y="0"/>
-          <a:chExt cx="0" cy="0"/>
-        </a:xfrm>
-      </p:grpSpPr>
-      <p:sp>
-        <p:nvSpPr>
-          <p:cNvPr id="4" name="TextBox 3"/>
-          <p:cNvSpPr txBox="1"/>
-          <p:nvPr/>
-        </p:nvSpPr>
-        <p:spPr>
-          <a:xfrm>
-            <a:off x="76200" y="-76200"/>
-            <a:ext cx="6258765" cy="646331"/>
-          </a:xfrm>
-          <a:prstGeom prst="rect">
-            <a:avLst/>
-          </a:prstGeom>
-          <a:noFill/>
-        </p:spPr>
-        <p:txBody>
-          <a:bodyPr wrap="none" rtlCol="0">
-            <a:spAutoFit/>
-          </a:bodyPr>
-          <a:lstStyle/>
-          <a:p>
-            <a:r>
-              <a:rPr lang="en-US" dirty="0"/>
-              <a:t>We’ve already seen examples of </a:t>
-            </a:r>
-            <a:r>
-              <a:rPr lang="en-US" dirty="0" err="1"/>
-              <a:t>CountDownLatch</a:t>
-            </a:r>
-            <a:r>
-              <a:rPr lang="en-US" dirty="0"/>
-              <a:t> this semester..</a:t>
-            </a:r>
-          </a:p>
-          <a:p>
-            <a:r>
-              <a:rPr lang="en-US" dirty="0"/>
-              <a:t>Very useful and easy to use way to coral your threads…</a:t>
-            </a:r>
-          </a:p>
-        </p:txBody>
-      </p:sp>
-      <p:pic>
-        <p:nvPicPr>
-          <p:cNvPr id="6" name="Picture 5"/>
-          <p:cNvPicPr>
-            <a:picLocks noChangeAspect="1"/>
-          </p:cNvPicPr>
-          <p:nvPr/>
-        </p:nvPicPr>
-        <p:blipFill>
-          <a:blip r:embed="rId2"/>
-          <a:stretch>
-            <a:fillRect/>
-          </a:stretch>
-        </p:blipFill>
-        <p:spPr>
-          <a:xfrm>
-            <a:off x="238544" y="533400"/>
-            <a:ext cx="5934075" cy="6076950"/>
-          </a:xfrm>
-          <a:prstGeom prst="rect">
-            <a:avLst/>
-          </a:prstGeom>
-        </p:spPr>
-      </p:pic>
-      <p:pic>
-        <p:nvPicPr>
-          <p:cNvPr id="7" name="Picture 6"/>
-          <p:cNvPicPr>
-            <a:picLocks noChangeAspect="1"/>
-          </p:cNvPicPr>
-          <p:nvPr/>
-        </p:nvPicPr>
-        <p:blipFill>
-          <a:blip r:embed="rId3"/>
-          <a:stretch>
-            <a:fillRect/>
-          </a:stretch>
-        </p:blipFill>
-        <p:spPr>
-          <a:xfrm>
-            <a:off x="5486400" y="4267200"/>
-            <a:ext cx="2590800" cy="1209675"/>
-          </a:xfrm>
-          <a:prstGeom prst="rect">
-            <a:avLst/>
-          </a:prstGeom>
-        </p:spPr>
-      </p:pic>
-    </p:spTree>
-    <p:extLst>
-      <p:ext uri="{BB962C8B-B14F-4D97-AF65-F5344CB8AC3E}">
-        <p14:creationId xmlns:p14="http://schemas.microsoft.com/office/powerpoint/2010/main" val="1150022246"/>
-      </p:ext>
-    </p:extLst>
-  </p:cSld>
-  <p:clrMapOvr>
-    <a:masterClrMapping/>
-  </p:clrMapOvr>
-  <p:timing>
-    <p:tnLst>
-      <p:par>
-        <p:cTn id="1" dur="indefinite" restart="never" nodeType="tmRoot"/>
-      </p:par>
-    </p:tnLst>
-  </p:timing>
-</p:sld>
-</file>
-
-<file path=ppt/slides/slide28.xml><?xml version="1.0" encoding="utf-8"?>
-<p:sld xmlns:a="http://schemas.openxmlformats.org/drawingml/2006/main" xmlns:r="http://schemas.openxmlformats.org/officeDocument/2006/relationships" xmlns:p="http://schemas.openxmlformats.org/presentationml/2006/main">
-  <p:cSld>
-    <p:spTree>
-      <p:nvGrpSpPr>
-        <p:cNvPr id="1" name=""/>
-        <p:cNvGrpSpPr/>
-        <p:nvPr/>
-      </p:nvGrpSpPr>
-      <p:grpSpPr>
-        <a:xfrm>
-          <a:off x="0" y="0"/>
-          <a:ext cx="0" cy="0"/>
-          <a:chOff x="0" y="0"/>
-          <a:chExt cx="0" cy="0"/>
-        </a:xfrm>
-      </p:grpSpPr>
-      <p:sp>
-        <p:nvSpPr>
           <p:cNvPr id="4" name="TextBox 3">
             <a:extLst>
               <a:ext uri="{FF2B5EF4-FFF2-40B4-BE49-F238E27FC236}">
@@ -6782,17 +6309,10 @@
   <p:clrMapOvr>
     <a:masterClrMapping/>
   </p:clrMapOvr>
-  <p:timing>
-    <p:tnLst>
-      <p:par>
-        <p:cTn id="1" dur="indefinite" restart="never" nodeType="tmRoot"/>
-      </p:par>
-    </p:tnLst>
-  </p:timing>
 </p:sld>
 </file>
 
-<file path=ppt/slides/slide29.xml><?xml version="1.0" encoding="utf-8"?>
+<file path=ppt/slides/slide27.xml><?xml version="1.0" encoding="utf-8"?>
 <p:sld xmlns:a="http://schemas.openxmlformats.org/drawingml/2006/main" xmlns:r="http://schemas.openxmlformats.org/officeDocument/2006/relationships" xmlns:p="http://schemas.openxmlformats.org/presentationml/2006/main">
   <p:cSld>
     <p:spTree>
@@ -6938,12 +6458,8 @@
           <a:lstStyle/>
           <a:p>
             <a:r>
-              <a:rPr lang="en-US" dirty="0" smtClean="0"/>
-              <a:t>168 threads works </a:t>
-            </a:r>
-            <a:r>
               <a:rPr lang="en-US" dirty="0"/>
-              <a:t>surprisingly well</a:t>
+              <a:t>168 threads works surprisingly well</a:t>
             </a:r>
           </a:p>
         </p:txBody>
@@ -6997,238 +6513,10 @@
   <p:clrMapOvr>
     <a:masterClrMapping/>
   </p:clrMapOvr>
-  <p:timing>
-    <p:tnLst>
-      <p:par>
-        <p:cTn id="1" dur="indefinite" restart="never" nodeType="tmRoot"/>
-      </p:par>
-    </p:tnLst>
-  </p:timing>
 </p:sld>
 </file>
 
-<file path=ppt/slides/slide3.xml><?xml version="1.0" encoding="utf-8"?>
-<p:sld xmlns:a="http://schemas.openxmlformats.org/drawingml/2006/main" xmlns:r="http://schemas.openxmlformats.org/officeDocument/2006/relationships" xmlns:p="http://schemas.openxmlformats.org/presentationml/2006/main">
-  <p:cSld>
-    <p:spTree>
-      <p:nvGrpSpPr>
-        <p:cNvPr id="1" name=""/>
-        <p:cNvGrpSpPr/>
-        <p:nvPr/>
-      </p:nvGrpSpPr>
-      <p:grpSpPr>
-        <a:xfrm>
-          <a:off x="0" y="0"/>
-          <a:ext cx="0" cy="0"/>
-          <a:chOff x="0" y="0"/>
-          <a:chExt cx="0" cy="0"/>
-        </a:xfrm>
-      </p:grpSpPr>
-      <p:sp>
-        <p:nvSpPr>
-          <p:cNvPr id="4" name="TextBox 3">
-            <a:extLst>
-              <a:ext uri="{FF2B5EF4-FFF2-40B4-BE49-F238E27FC236}">
-                <a16:creationId xmlns:a16="http://schemas.microsoft.com/office/drawing/2014/main" id="{806D7657-15EF-4D04-A984-9BC364236F3C}"/>
-              </a:ext>
-            </a:extLst>
-          </p:cNvPr>
-          <p:cNvSpPr txBox="1"/>
-          <p:nvPr/>
-        </p:nvSpPr>
-        <p:spPr>
-          <a:xfrm>
-            <a:off x="228600" y="-36731"/>
-            <a:ext cx="8939435" cy="646331"/>
-          </a:xfrm>
-          <a:prstGeom prst="rect">
-            <a:avLst/>
-          </a:prstGeom>
-          <a:noFill/>
-        </p:spPr>
-        <p:txBody>
-          <a:bodyPr wrap="none" rtlCol="0">
-            <a:spAutoFit/>
-          </a:bodyPr>
-          <a:lstStyle/>
-          <a:p>
-            <a:r>
-              <a:rPr lang="en-US" dirty="0">
-                <a:latin typeface="Arial" panose="020B0604020202020204" pitchFamily="34" charset="0"/>
-              </a:rPr>
-              <a:t>Let’s say my goal is to have all of the GC contents in a list…</a:t>
-            </a:r>
-          </a:p>
-          <a:p>
-            <a:r>
-              <a:rPr lang="en-US" dirty="0">
-                <a:latin typeface="Arial" panose="020B0604020202020204" pitchFamily="34" charset="0"/>
-              </a:rPr>
-              <a:t>At this point in the semester, this is not difficult to achieve in a single-threaded matter..</a:t>
-            </a:r>
-          </a:p>
-        </p:txBody>
-      </p:sp>
-      <p:pic>
-        <p:nvPicPr>
-          <p:cNvPr id="5" name="Picture 4">
-            <a:extLst>
-              <a:ext uri="{FF2B5EF4-FFF2-40B4-BE49-F238E27FC236}">
-                <a16:creationId xmlns:a16="http://schemas.microsoft.com/office/drawing/2014/main" id="{6A76B773-8522-4CB9-B926-BAECFD9606E7}"/>
-              </a:ext>
-            </a:extLst>
-          </p:cNvPr>
-          <p:cNvPicPr>
-            <a:picLocks noChangeAspect="1"/>
-          </p:cNvPicPr>
-          <p:nvPr/>
-        </p:nvPicPr>
-        <p:blipFill>
-          <a:blip r:embed="rId2"/>
-          <a:stretch>
-            <a:fillRect/>
-          </a:stretch>
-        </p:blipFill>
-        <p:spPr>
-          <a:xfrm>
-            <a:off x="0" y="609600"/>
-            <a:ext cx="9144000" cy="4458227"/>
-          </a:xfrm>
-          <a:prstGeom prst="rect">
-            <a:avLst/>
-          </a:prstGeom>
-        </p:spPr>
-      </p:pic>
-      <p:sp>
-        <p:nvSpPr>
-          <p:cNvPr id="7" name="TextBox 6">
-            <a:extLst>
-              <a:ext uri="{FF2B5EF4-FFF2-40B4-BE49-F238E27FC236}">
-                <a16:creationId xmlns:a16="http://schemas.microsoft.com/office/drawing/2014/main" id="{E95C9D23-5D94-48E7-AD73-4528621427CE}"/>
-              </a:ext>
-            </a:extLst>
-          </p:cNvPr>
-          <p:cNvSpPr txBox="1"/>
-          <p:nvPr/>
-        </p:nvSpPr>
-        <p:spPr>
-          <a:xfrm>
-            <a:off x="381000" y="5029200"/>
-            <a:ext cx="8565165" cy="646331"/>
-          </a:xfrm>
-          <a:prstGeom prst="rect">
-            <a:avLst/>
-          </a:prstGeom>
-          <a:noFill/>
-        </p:spPr>
-        <p:txBody>
-          <a:bodyPr wrap="none" rtlCol="0">
-            <a:spAutoFit/>
-          </a:bodyPr>
-          <a:lstStyle/>
-          <a:p>
-            <a:r>
-              <a:rPr lang="en-US" dirty="0">
-                <a:latin typeface="Arial" panose="020B0604020202020204" pitchFamily="34" charset="0"/>
-              </a:rPr>
-              <a:t>On a 4-core laptop (on battery power on an airplane) this takes about ~8.5 secs for</a:t>
-            </a:r>
-          </a:p>
-          <a:p>
-            <a:r>
-              <a:rPr lang="en-US" dirty="0">
-                <a:latin typeface="Arial" panose="020B0604020202020204" pitchFamily="34" charset="0"/>
-              </a:rPr>
-              <a:t>~ 1.4 million sequences</a:t>
-            </a:r>
-          </a:p>
-        </p:txBody>
-      </p:sp>
-      <p:pic>
-        <p:nvPicPr>
-          <p:cNvPr id="9" name="Picture 8">
-            <a:extLst>
-              <a:ext uri="{FF2B5EF4-FFF2-40B4-BE49-F238E27FC236}">
-                <a16:creationId xmlns:a16="http://schemas.microsoft.com/office/drawing/2014/main" id="{5601CF59-523F-45A0-9EC5-F2B160DF1628}"/>
-              </a:ext>
-            </a:extLst>
-          </p:cNvPr>
-          <p:cNvPicPr>
-            <a:picLocks noChangeAspect="1"/>
-          </p:cNvPicPr>
-          <p:nvPr/>
-        </p:nvPicPr>
-        <p:blipFill>
-          <a:blip r:embed="rId3"/>
-          <a:stretch>
-            <a:fillRect/>
-          </a:stretch>
-        </p:blipFill>
-        <p:spPr>
-          <a:xfrm>
-            <a:off x="3429000" y="5486400"/>
-            <a:ext cx="4629150" cy="990600"/>
-          </a:xfrm>
-          <a:prstGeom prst="rect">
-            <a:avLst/>
-          </a:prstGeom>
-        </p:spPr>
-      </p:pic>
-      <p:sp>
-        <p:nvSpPr>
-          <p:cNvPr id="2" name="Rectangle 1">
-            <a:extLst>
-              <a:ext uri="{FF2B5EF4-FFF2-40B4-BE49-F238E27FC236}">
-                <a16:creationId xmlns:a16="http://schemas.microsoft.com/office/drawing/2014/main" id="{BD313CCC-03F9-47FE-99A9-6CC1E6EE01C1}"/>
-              </a:ext>
-            </a:extLst>
-          </p:cNvPr>
-          <p:cNvSpPr/>
-          <p:nvPr/>
-        </p:nvSpPr>
-        <p:spPr>
-          <a:xfrm>
-            <a:off x="76200" y="6553200"/>
-            <a:ext cx="11353800" cy="276999"/>
-          </a:xfrm>
-          <a:prstGeom prst="rect">
-            <a:avLst/>
-          </a:prstGeom>
-        </p:spPr>
-        <p:txBody>
-          <a:bodyPr wrap="square">
-            <a:spAutoFit/>
-          </a:bodyPr>
-          <a:lstStyle/>
-          <a:p>
-            <a:r>
-              <a:rPr lang="en-US" sz="1200" dirty="0"/>
-              <a:t>https://github.com/afodor/metagenomicsTools/blob/master/src/classExamples/semaphoreAndBlockingQueues/GatherAllGCSingleThread.java</a:t>
-            </a:r>
-          </a:p>
-        </p:txBody>
-      </p:sp>
-    </p:spTree>
-    <p:extLst>
-      <p:ext uri="{BB962C8B-B14F-4D97-AF65-F5344CB8AC3E}">
-        <p14:creationId xmlns:p14="http://schemas.microsoft.com/office/powerpoint/2010/main" val="3474402380"/>
-      </p:ext>
-    </p:extLst>
-  </p:cSld>
-  <p:clrMapOvr>
-    <a:masterClrMapping/>
-  </p:clrMapOvr>
-  <p:timing>
-    <p:tnLst>
-      <p:par>
-        <p:cTn id="1" dur="indefinite" restart="never" nodeType="tmRoot"/>
-      </p:par>
-    </p:tnLst>
-  </p:timing>
-</p:sld>
-</file>
-
-<file path=ppt/slides/slide30.xml><?xml version="1.0" encoding="utf-8"?>
+<file path=ppt/slides/slide28.xml><?xml version="1.0" encoding="utf-8"?>
 <p:sld xmlns:a="http://schemas.openxmlformats.org/drawingml/2006/main" xmlns:r="http://schemas.openxmlformats.org/officeDocument/2006/relationships" xmlns:p="http://schemas.openxmlformats.org/presentationml/2006/main">
   <p:cSld>
     <p:spTree>
@@ -7357,17 +6645,10 @@
   <p:clrMapOvr>
     <a:masterClrMapping/>
   </p:clrMapOvr>
-  <p:timing>
-    <p:tnLst>
-      <p:par>
-        <p:cTn id="1" dur="indefinite" restart="never" nodeType="tmRoot"/>
-      </p:par>
-    </p:tnLst>
-  </p:timing>
 </p:sld>
 </file>
 
-<file path=ppt/slides/slide31.xml><?xml version="1.0" encoding="utf-8"?>
+<file path=ppt/slides/slide29.xml><?xml version="1.0" encoding="utf-8"?>
 <p:sld xmlns:a="http://schemas.openxmlformats.org/drawingml/2006/main" xmlns:r="http://schemas.openxmlformats.org/officeDocument/2006/relationships" xmlns:p="http://schemas.openxmlformats.org/presentationml/2006/main">
   <p:cSld>
     <p:spTree>
@@ -7482,17 +6763,224 @@
   <p:clrMapOvr>
     <a:masterClrMapping/>
   </p:clrMapOvr>
-  <p:timing>
-    <p:tnLst>
-      <p:par>
-        <p:cTn id="1" dur="indefinite" restart="never" nodeType="tmRoot"/>
-      </p:par>
-    </p:tnLst>
-  </p:timing>
 </p:sld>
 </file>
 
-<file path=ppt/slides/slide32.xml><?xml version="1.0" encoding="utf-8"?>
+<file path=ppt/slides/slide3.xml><?xml version="1.0" encoding="utf-8"?>
+<p:sld xmlns:a="http://schemas.openxmlformats.org/drawingml/2006/main" xmlns:r="http://schemas.openxmlformats.org/officeDocument/2006/relationships" xmlns:p="http://schemas.openxmlformats.org/presentationml/2006/main">
+  <p:cSld>
+    <p:spTree>
+      <p:nvGrpSpPr>
+        <p:cNvPr id="1" name=""/>
+        <p:cNvGrpSpPr/>
+        <p:nvPr/>
+      </p:nvGrpSpPr>
+      <p:grpSpPr>
+        <a:xfrm>
+          <a:off x="0" y="0"/>
+          <a:ext cx="0" cy="0"/>
+          <a:chOff x="0" y="0"/>
+          <a:chExt cx="0" cy="0"/>
+        </a:xfrm>
+      </p:grpSpPr>
+      <p:sp>
+        <p:nvSpPr>
+          <p:cNvPr id="4" name="TextBox 3">
+            <a:extLst>
+              <a:ext uri="{FF2B5EF4-FFF2-40B4-BE49-F238E27FC236}">
+                <a16:creationId xmlns:a16="http://schemas.microsoft.com/office/drawing/2014/main" id="{806D7657-15EF-4D04-A984-9BC364236F3C}"/>
+              </a:ext>
+            </a:extLst>
+          </p:cNvPr>
+          <p:cNvSpPr txBox="1"/>
+          <p:nvPr/>
+        </p:nvSpPr>
+        <p:spPr>
+          <a:xfrm>
+            <a:off x="228600" y="-36731"/>
+            <a:ext cx="8939435" cy="646331"/>
+          </a:xfrm>
+          <a:prstGeom prst="rect">
+            <a:avLst/>
+          </a:prstGeom>
+          <a:noFill/>
+        </p:spPr>
+        <p:txBody>
+          <a:bodyPr wrap="none" rtlCol="0">
+            <a:spAutoFit/>
+          </a:bodyPr>
+          <a:lstStyle/>
+          <a:p>
+            <a:r>
+              <a:rPr lang="en-US" dirty="0">
+                <a:latin typeface="Arial" panose="020B0604020202020204" pitchFamily="34" charset="0"/>
+              </a:rPr>
+              <a:t>Let’s say my goal is to have all of the GC contents in a list…</a:t>
+            </a:r>
+          </a:p>
+          <a:p>
+            <a:r>
+              <a:rPr lang="en-US" dirty="0">
+                <a:latin typeface="Arial" panose="020B0604020202020204" pitchFamily="34" charset="0"/>
+              </a:rPr>
+              <a:t>At this point in the semester, this is not difficult to achieve in a single-threaded matter..</a:t>
+            </a:r>
+          </a:p>
+        </p:txBody>
+      </p:sp>
+      <p:pic>
+        <p:nvPicPr>
+          <p:cNvPr id="5" name="Picture 4">
+            <a:extLst>
+              <a:ext uri="{FF2B5EF4-FFF2-40B4-BE49-F238E27FC236}">
+                <a16:creationId xmlns:a16="http://schemas.microsoft.com/office/drawing/2014/main" id="{6A76B773-8522-4CB9-B926-BAECFD9606E7}"/>
+              </a:ext>
+            </a:extLst>
+          </p:cNvPr>
+          <p:cNvPicPr>
+            <a:picLocks noChangeAspect="1"/>
+          </p:cNvPicPr>
+          <p:nvPr/>
+        </p:nvPicPr>
+        <p:blipFill>
+          <a:blip r:embed="rId2"/>
+          <a:stretch>
+            <a:fillRect/>
+          </a:stretch>
+        </p:blipFill>
+        <p:spPr>
+          <a:xfrm>
+            <a:off x="0" y="609600"/>
+            <a:ext cx="9144000" cy="4458227"/>
+          </a:xfrm>
+          <a:prstGeom prst="rect">
+            <a:avLst/>
+          </a:prstGeom>
+        </p:spPr>
+      </p:pic>
+      <p:sp>
+        <p:nvSpPr>
+          <p:cNvPr id="7" name="TextBox 6">
+            <a:extLst>
+              <a:ext uri="{FF2B5EF4-FFF2-40B4-BE49-F238E27FC236}">
+                <a16:creationId xmlns:a16="http://schemas.microsoft.com/office/drawing/2014/main" id="{E95C9D23-5D94-48E7-AD73-4528621427CE}"/>
+              </a:ext>
+            </a:extLst>
+          </p:cNvPr>
+          <p:cNvSpPr txBox="1"/>
+          <p:nvPr/>
+        </p:nvSpPr>
+        <p:spPr>
+          <a:xfrm>
+            <a:off x="381000" y="5029200"/>
+            <a:ext cx="8565165" cy="646331"/>
+          </a:xfrm>
+          <a:prstGeom prst="rect">
+            <a:avLst/>
+          </a:prstGeom>
+          <a:noFill/>
+        </p:spPr>
+        <p:txBody>
+          <a:bodyPr wrap="none" rtlCol="0">
+            <a:spAutoFit/>
+          </a:bodyPr>
+          <a:lstStyle/>
+          <a:p>
+            <a:r>
+              <a:rPr lang="en-US" dirty="0">
+                <a:latin typeface="Arial" panose="020B0604020202020204" pitchFamily="34" charset="0"/>
+              </a:rPr>
+              <a:t>On a 4-core laptop (on battery power on an airplane) this takes about ~8.5 secs for</a:t>
+            </a:r>
+          </a:p>
+          <a:p>
+            <a:r>
+              <a:rPr lang="en-US" dirty="0">
+                <a:latin typeface="Arial" panose="020B0604020202020204" pitchFamily="34" charset="0"/>
+              </a:rPr>
+              <a:t>~ 1.4 million sequences</a:t>
+            </a:r>
+          </a:p>
+        </p:txBody>
+      </p:sp>
+      <p:pic>
+        <p:nvPicPr>
+          <p:cNvPr id="9" name="Picture 8">
+            <a:extLst>
+              <a:ext uri="{FF2B5EF4-FFF2-40B4-BE49-F238E27FC236}">
+                <a16:creationId xmlns:a16="http://schemas.microsoft.com/office/drawing/2014/main" id="{5601CF59-523F-45A0-9EC5-F2B160DF1628}"/>
+              </a:ext>
+            </a:extLst>
+          </p:cNvPr>
+          <p:cNvPicPr>
+            <a:picLocks noChangeAspect="1"/>
+          </p:cNvPicPr>
+          <p:nvPr/>
+        </p:nvPicPr>
+        <p:blipFill>
+          <a:blip r:embed="rId3"/>
+          <a:stretch>
+            <a:fillRect/>
+          </a:stretch>
+        </p:blipFill>
+        <p:spPr>
+          <a:xfrm>
+            <a:off x="3429000" y="5486400"/>
+            <a:ext cx="4629150" cy="990600"/>
+          </a:xfrm>
+          <a:prstGeom prst="rect">
+            <a:avLst/>
+          </a:prstGeom>
+        </p:spPr>
+      </p:pic>
+      <p:sp>
+        <p:nvSpPr>
+          <p:cNvPr id="2" name="Rectangle 1">
+            <a:extLst>
+              <a:ext uri="{FF2B5EF4-FFF2-40B4-BE49-F238E27FC236}">
+                <a16:creationId xmlns:a16="http://schemas.microsoft.com/office/drawing/2014/main" id="{BD313CCC-03F9-47FE-99A9-6CC1E6EE01C1}"/>
+              </a:ext>
+            </a:extLst>
+          </p:cNvPr>
+          <p:cNvSpPr/>
+          <p:nvPr/>
+        </p:nvSpPr>
+        <p:spPr>
+          <a:xfrm>
+            <a:off x="76200" y="6553200"/>
+            <a:ext cx="11353800" cy="276999"/>
+          </a:xfrm>
+          <a:prstGeom prst="rect">
+            <a:avLst/>
+          </a:prstGeom>
+        </p:spPr>
+        <p:txBody>
+          <a:bodyPr wrap="square">
+            <a:spAutoFit/>
+          </a:bodyPr>
+          <a:lstStyle/>
+          <a:p>
+            <a:r>
+              <a:rPr lang="en-US" sz="1200" dirty="0"/>
+              <a:t>https://github.com/afodor/metagenomicsTools/blob/master/src/classExamples/semaphoreAndBlockingQueues/GatherAllGCSingleThread.java</a:t>
+            </a:r>
+          </a:p>
+        </p:txBody>
+      </p:sp>
+    </p:spTree>
+    <p:extLst>
+      <p:ext uri="{BB962C8B-B14F-4D97-AF65-F5344CB8AC3E}">
+        <p14:creationId xmlns:p14="http://schemas.microsoft.com/office/powerpoint/2010/main" val="3474402380"/>
+      </p:ext>
+    </p:extLst>
+  </p:cSld>
+  <p:clrMapOvr>
+    <a:masterClrMapping/>
+  </p:clrMapOvr>
+</p:sld>
+</file>
+
+<file path=ppt/slides/slide30.xml><?xml version="1.0" encoding="utf-8"?>
 <p:sld xmlns:a="http://schemas.openxmlformats.org/drawingml/2006/main" xmlns:r="http://schemas.openxmlformats.org/officeDocument/2006/relationships" xmlns:p="http://schemas.openxmlformats.org/presentationml/2006/main">
   <p:cSld>
     <p:spTree>
@@ -7652,17 +7140,10 @@
   <p:clrMapOvr>
     <a:masterClrMapping/>
   </p:clrMapOvr>
-  <p:timing>
-    <p:tnLst>
-      <p:par>
-        <p:cTn id="1" dur="indefinite" restart="never" nodeType="tmRoot"/>
-      </p:par>
-    </p:tnLst>
-  </p:timing>
 </p:sld>
 </file>
 
-<file path=ppt/slides/slide33.xml><?xml version="1.0" encoding="utf-8"?>
+<file path=ppt/slides/slide31.xml><?xml version="1.0" encoding="utf-8"?>
 <p:sld xmlns:a="http://schemas.openxmlformats.org/drawingml/2006/main" xmlns:r="http://schemas.openxmlformats.org/officeDocument/2006/relationships" xmlns:p="http://schemas.openxmlformats.org/presentationml/2006/main">
   <p:cSld>
     <p:spTree>
@@ -7759,17 +7240,10 @@
   <p:clrMapOvr>
     <a:masterClrMapping/>
   </p:clrMapOvr>
-  <p:timing>
-    <p:tnLst>
-      <p:par>
-        <p:cTn id="1" dur="indefinite" restart="never" nodeType="tmRoot"/>
-      </p:par>
-    </p:tnLst>
-  </p:timing>
 </p:sld>
 </file>
 
-<file path=ppt/slides/slide34.xml><?xml version="1.0" encoding="utf-8"?>
+<file path=ppt/slides/slide32.xml><?xml version="1.0" encoding="utf-8"?>
 <p:sld xmlns:a="http://schemas.openxmlformats.org/drawingml/2006/main" xmlns:r="http://schemas.openxmlformats.org/officeDocument/2006/relationships" xmlns:p="http://schemas.openxmlformats.org/presentationml/2006/main">
   <p:cSld>
     <p:spTree>
@@ -7933,17 +7407,10 @@
   <p:clrMapOvr>
     <a:masterClrMapping/>
   </p:clrMapOvr>
-  <p:timing>
-    <p:tnLst>
-      <p:par>
-        <p:cTn id="1" dur="indefinite" restart="never" nodeType="tmRoot"/>
-      </p:par>
-    </p:tnLst>
-  </p:timing>
 </p:sld>
 </file>
 
-<file path=ppt/slides/slide35.xml><?xml version="1.0" encoding="utf-8"?>
+<file path=ppt/slides/slide33.xml><?xml version="1.0" encoding="utf-8"?>
 <p:sld xmlns:a="http://schemas.openxmlformats.org/drawingml/2006/main" xmlns:r="http://schemas.openxmlformats.org/officeDocument/2006/relationships" xmlns:p="http://schemas.openxmlformats.org/presentationml/2006/main">
   <p:cSld>
     <p:spTree>
@@ -8058,17 +7525,10 @@
   <p:clrMapOvr>
     <a:masterClrMapping/>
   </p:clrMapOvr>
-  <p:timing>
-    <p:tnLst>
-      <p:par>
-        <p:cTn id="1" dur="indefinite" restart="never" nodeType="tmRoot"/>
-      </p:par>
-    </p:tnLst>
-  </p:timing>
 </p:sld>
 </file>
 
-<file path=ppt/slides/slide36.xml><?xml version="1.0" encoding="utf-8"?>
+<file path=ppt/slides/slide34.xml><?xml version="1.0" encoding="utf-8"?>
 <p:sld xmlns:a="http://schemas.openxmlformats.org/drawingml/2006/main" xmlns:r="http://schemas.openxmlformats.org/officeDocument/2006/relationships" xmlns:p="http://schemas.openxmlformats.org/presentationml/2006/main">
   <p:cSld>
     <p:spTree>
@@ -8118,7 +7578,7 @@
               <a:t>We can combine semaphore and </a:t>
             </a:r>
             <a:r>
-              <a:rPr lang="en-US" dirty="0" err="1" smtClean="0"/>
+              <a:rPr lang="en-US" dirty="0" err="1"/>
               <a:t>FutureTask</a:t>
             </a:r>
             <a:endParaRPr lang="en-US" dirty="0"/>
@@ -8242,17 +7702,10 @@
   <p:clrMapOvr>
     <a:masterClrMapping/>
   </p:clrMapOvr>
-  <p:timing>
-    <p:tnLst>
-      <p:par>
-        <p:cTn id="1" dur="indefinite" restart="never" nodeType="tmRoot"/>
-      </p:par>
-    </p:tnLst>
-  </p:timing>
 </p:sld>
 </file>
 
-<file path=ppt/slides/slide37.xml><?xml version="1.0" encoding="utf-8"?>
+<file path=ppt/slides/slide35.xml><?xml version="1.0" encoding="utf-8"?>
 <p:sld xmlns:a="http://schemas.openxmlformats.org/drawingml/2006/main" xmlns:r="http://schemas.openxmlformats.org/officeDocument/2006/relationships" xmlns:p="http://schemas.openxmlformats.org/presentationml/2006/main">
   <p:cSld>
     <p:spTree>
@@ -8337,13 +7790,8 @@
             </a:r>
             <a:r>
               <a:rPr lang="en-US" dirty="0"/>
-              <a:t> 4 at a </a:t>
-            </a:r>
-            <a:r>
-              <a:rPr lang="en-US" dirty="0" smtClean="0"/>
-              <a:t>time (if NUM_WORKERS is set to 4)</a:t>
-            </a:r>
-            <a:endParaRPr lang="en-US" dirty="0"/>
+              <a:t> 4 at a time (if NUM_WORKERS is set to 4)</a:t>
+            </a:r>
           </a:p>
         </p:txBody>
       </p:sp>
@@ -8413,13 +7861,8 @@
           <a:p>
             <a:r>
               <a:rPr lang="en-US" dirty="0"/>
-              <a:t>to our other multi-threaded </a:t>
-            </a:r>
-            <a:r>
-              <a:rPr lang="en-US" dirty="0" smtClean="0"/>
-              <a:t>approaches</a:t>
-            </a:r>
-            <a:endParaRPr lang="en-US" dirty="0"/>
+              <a:t>to our other multi-threaded approaches</a:t>
+            </a:r>
           </a:p>
         </p:txBody>
       </p:sp>
@@ -8479,16 +7922,12 @@
           <a:lstStyle/>
           <a:p>
             <a:r>
-              <a:rPr lang="en-US" dirty="0" smtClean="0">
+              <a:rPr lang="en-US" dirty="0">
                 <a:latin typeface="Arial" panose="020B0604020202020204" pitchFamily="34" charset="0"/>
                 <a:cs typeface="Arial" panose="020B0604020202020204" pitchFamily="34" charset="0"/>
               </a:rPr>
               <a:t>Will block until last Callable finishes</a:t>
             </a:r>
-            <a:endParaRPr lang="en-US" dirty="0">
-              <a:latin typeface="Arial" panose="020B0604020202020204" pitchFamily="34" charset="0"/>
-              <a:cs typeface="Arial" panose="020B0604020202020204" pitchFamily="34" charset="0"/>
-            </a:endParaRPr>
           </a:p>
         </p:txBody>
       </p:sp>
@@ -8502,13 +7941,225 @@
   <p:clrMapOvr>
     <a:masterClrMapping/>
   </p:clrMapOvr>
-  <p:timing>
-    <p:tnLst>
-      <p:par>
-        <p:cTn id="1" dur="indefinite" restart="never" nodeType="tmRoot"/>
-      </p:par>
-    </p:tnLst>
-  </p:timing>
+</p:sld>
+</file>
+
+<file path=ppt/slides/slide36.xml><?xml version="1.0" encoding="utf-8"?>
+<p:sld xmlns:a="http://schemas.openxmlformats.org/drawingml/2006/main" xmlns:r="http://schemas.openxmlformats.org/officeDocument/2006/relationships" xmlns:p="http://schemas.openxmlformats.org/presentationml/2006/main">
+  <p:cSld>
+    <p:spTree>
+      <p:nvGrpSpPr>
+        <p:cNvPr id="1" name=""/>
+        <p:cNvGrpSpPr/>
+        <p:nvPr/>
+      </p:nvGrpSpPr>
+      <p:grpSpPr>
+        <a:xfrm>
+          <a:off x="0" y="0"/>
+          <a:ext cx="0" cy="0"/>
+          <a:chOff x="0" y="0"/>
+          <a:chExt cx="0" cy="0"/>
+        </a:xfrm>
+      </p:grpSpPr>
+      <p:sp>
+        <p:nvSpPr>
+          <p:cNvPr id="6" name="TextBox 5"/>
+          <p:cNvSpPr txBox="1"/>
+          <p:nvPr/>
+        </p:nvSpPr>
+        <p:spPr>
+          <a:xfrm>
+            <a:off x="609600" y="457200"/>
+            <a:ext cx="3889655" cy="2308324"/>
+          </a:xfrm>
+          <a:prstGeom prst="rect">
+            <a:avLst/>
+          </a:prstGeom>
+          <a:noFill/>
+        </p:spPr>
+        <p:txBody>
+          <a:bodyPr wrap="none" rtlCol="0">
+            <a:spAutoFit/>
+          </a:bodyPr>
+          <a:lstStyle/>
+          <a:p>
+            <a:r>
+              <a:rPr lang="en-US" dirty="0" err="1"/>
+              <a:t>BlockingQueues</a:t>
+            </a:r>
+            <a:endParaRPr lang="en-US" dirty="0"/>
+          </a:p>
+          <a:p>
+            <a:r>
+              <a:rPr lang="en-US" dirty="0"/>
+              <a:t>A Peak calling example with semaphore</a:t>
+            </a:r>
+          </a:p>
+          <a:p>
+            <a:r>
+              <a:rPr lang="en-US" dirty="0" err="1"/>
+              <a:t>CountDownLatch</a:t>
+            </a:r>
+            <a:endParaRPr lang="en-US" dirty="0"/>
+          </a:p>
+          <a:p>
+            <a:r>
+              <a:rPr lang="en-US" dirty="0"/>
+              <a:t>Callable, Future, </a:t>
+            </a:r>
+            <a:r>
+              <a:rPr lang="en-US" dirty="0" err="1"/>
+              <a:t>FutureTask</a:t>
+            </a:r>
+            <a:endParaRPr lang="en-US" dirty="0"/>
+          </a:p>
+          <a:p>
+            <a:r>
+              <a:rPr lang="en-US" dirty="0"/>
+              <a:t>Cancellation</a:t>
+            </a:r>
+          </a:p>
+          <a:p>
+            <a:endParaRPr lang="en-US" dirty="0"/>
+          </a:p>
+          <a:p>
+            <a:endParaRPr lang="en-US" dirty="0"/>
+          </a:p>
+          <a:p>
+            <a:endParaRPr lang="en-US" dirty="0"/>
+          </a:p>
+        </p:txBody>
+      </p:sp>
+      <p:cxnSp>
+        <p:nvCxnSpPr>
+          <p:cNvPr id="7" name="Straight Arrow Connector 6"/>
+          <p:cNvCxnSpPr/>
+          <p:nvPr/>
+        </p:nvCxnSpPr>
+        <p:spPr>
+          <a:xfrm rot="10800000">
+            <a:off x="1905000" y="1751011"/>
+            <a:ext cx="533400" cy="1588"/>
+          </a:xfrm>
+          <a:prstGeom prst="straightConnector1">
+            <a:avLst/>
+          </a:prstGeom>
+          <a:ln>
+            <a:tailEnd type="arrow"/>
+          </a:ln>
+        </p:spPr>
+        <p:style>
+          <a:lnRef idx="1">
+            <a:schemeClr val="accent1"/>
+          </a:lnRef>
+          <a:fillRef idx="0">
+            <a:schemeClr val="accent1"/>
+          </a:fillRef>
+          <a:effectRef idx="0">
+            <a:schemeClr val="accent1"/>
+          </a:effectRef>
+          <a:fontRef idx="minor">
+            <a:schemeClr val="tx1"/>
+          </a:fontRef>
+        </p:style>
+      </p:cxnSp>
+    </p:spTree>
+  </p:cSld>
+  <p:clrMapOvr>
+    <a:masterClrMapping/>
+  </p:clrMapOvr>
+</p:sld>
+</file>
+
+<file path=ppt/slides/slide37.xml><?xml version="1.0" encoding="utf-8"?>
+<p:sld xmlns:a="http://schemas.openxmlformats.org/drawingml/2006/main" xmlns:r="http://schemas.openxmlformats.org/officeDocument/2006/relationships" xmlns:p="http://schemas.openxmlformats.org/presentationml/2006/main">
+  <p:cSld>
+    <p:spTree>
+      <p:nvGrpSpPr>
+        <p:cNvPr id="1" name=""/>
+        <p:cNvGrpSpPr/>
+        <p:nvPr/>
+      </p:nvGrpSpPr>
+      <p:grpSpPr>
+        <a:xfrm>
+          <a:off x="0" y="0"/>
+          <a:ext cx="0" cy="0"/>
+          <a:chOff x="0" y="0"/>
+          <a:chExt cx="0" cy="0"/>
+        </a:xfrm>
+      </p:grpSpPr>
+      <p:pic>
+        <p:nvPicPr>
+          <p:cNvPr id="3074" name="Picture 2"/>
+          <p:cNvPicPr>
+            <a:picLocks noChangeAspect="1" noChangeArrowheads="1"/>
+          </p:cNvPicPr>
+          <p:nvPr/>
+        </p:nvPicPr>
+        <p:blipFill>
+          <a:blip r:embed="rId2" cstate="print"/>
+          <a:srcRect/>
+          <a:stretch>
+            <a:fillRect/>
+          </a:stretch>
+        </p:blipFill>
+        <p:spPr bwMode="auto">
+          <a:xfrm>
+            <a:off x="276225" y="1914525"/>
+            <a:ext cx="8591550" cy="3028950"/>
+          </a:xfrm>
+          <a:prstGeom prst="rect">
+            <a:avLst/>
+          </a:prstGeom>
+          <a:noFill/>
+          <a:ln w="9525">
+            <a:noFill/>
+            <a:miter lim="800000"/>
+            <a:headEnd/>
+            <a:tailEnd/>
+          </a:ln>
+        </p:spPr>
+      </p:pic>
+      <p:sp>
+        <p:nvSpPr>
+          <p:cNvPr id="5" name="TextBox 4"/>
+          <p:cNvSpPr txBox="1"/>
+          <p:nvPr/>
+        </p:nvSpPr>
+        <p:spPr>
+          <a:xfrm>
+            <a:off x="381000" y="990600"/>
+            <a:ext cx="8172109" cy="646331"/>
+          </a:xfrm>
+          <a:prstGeom prst="rect">
+            <a:avLst/>
+          </a:prstGeom>
+          <a:noFill/>
+        </p:spPr>
+        <p:txBody>
+          <a:bodyPr wrap="none" rtlCol="0">
+            <a:spAutoFit/>
+          </a:bodyPr>
+          <a:lstStyle/>
+          <a:p>
+            <a:r>
+              <a:rPr lang="en-US" dirty="0"/>
+              <a:t>Future also supports cancellation, but this is dependent upon the co-operation of the</a:t>
+            </a:r>
+          </a:p>
+          <a:p>
+            <a:r>
+              <a:rPr lang="en-US" dirty="0"/>
+              <a:t>running threads…</a:t>
+            </a:r>
+          </a:p>
+        </p:txBody>
+      </p:sp>
+    </p:spTree>
+  </p:cSld>
+  <p:clrMapOvr>
+    <a:masterClrMapping/>
+  </p:clrMapOvr>
 </p:sld>
 </file>
 
@@ -8529,16 +8180,48 @@
           <a:chExt cx="0" cy="0"/>
         </a:xfrm>
       </p:grpSpPr>
-      <p:sp>
-        <p:nvSpPr>
-          <p:cNvPr id="6" name="TextBox 5"/>
+      <p:pic>
+        <p:nvPicPr>
+          <p:cNvPr id="1026" name="Picture 2"/>
+          <p:cNvPicPr>
+            <a:picLocks noChangeAspect="1" noChangeArrowheads="1"/>
+          </p:cNvPicPr>
+          <p:nvPr/>
+        </p:nvPicPr>
+        <p:blipFill>
+          <a:blip r:embed="rId2" cstate="print"/>
+          <a:srcRect/>
+          <a:stretch>
+            <a:fillRect/>
+          </a:stretch>
+        </p:blipFill>
+        <p:spPr bwMode="auto">
+          <a:xfrm>
+            <a:off x="314325" y="2047875"/>
+            <a:ext cx="8515350" cy="2762250"/>
+          </a:xfrm>
+          <a:prstGeom prst="rect">
+            <a:avLst/>
+          </a:prstGeom>
+          <a:noFill/>
+          <a:ln w="9525">
+            <a:noFill/>
+            <a:miter lim="800000"/>
+            <a:headEnd/>
+            <a:tailEnd/>
+          </a:ln>
+        </p:spPr>
+      </p:pic>
+      <p:sp>
+        <p:nvSpPr>
+          <p:cNvPr id="3" name="TextBox 2"/>
           <p:cNvSpPr txBox="1"/>
           <p:nvPr/>
         </p:nvSpPr>
         <p:spPr>
           <a:xfrm>
-            <a:off x="609600" y="457200"/>
-            <a:ext cx="3889655" cy="2308324"/>
+            <a:off x="457200" y="218182"/>
+            <a:ext cx="7620000" cy="1323439"/>
           </a:xfrm>
           <a:prstGeom prst="rect">
             <a:avLst/>
@@ -8546,103 +8229,66 @@
           <a:noFill/>
         </p:spPr>
         <p:txBody>
-          <a:bodyPr wrap="none" rtlCol="0">
+          <a:bodyPr wrap="square" rtlCol="0">
             <a:spAutoFit/>
           </a:bodyPr>
           <a:lstStyle/>
           <a:p>
             <a:r>
-              <a:rPr lang="en-US" dirty="0" err="1"/>
-              <a:t>BlockingQueues</a:t>
-            </a:r>
-            <a:endParaRPr lang="en-US" dirty="0"/>
-          </a:p>
-          <a:p>
-            <a:r>
-              <a:rPr lang="en-US" dirty="0"/>
-              <a:t>A Peak calling example with semaphore</a:t>
-            </a:r>
-          </a:p>
-          <a:p>
-            <a:r>
-              <a:rPr lang="en-US" dirty="0" err="1"/>
-              <a:t>CountDownLatch</a:t>
-            </a:r>
-            <a:endParaRPr lang="en-US" dirty="0"/>
-          </a:p>
-          <a:p>
-            <a:r>
-              <a:rPr lang="en-US" dirty="0"/>
-              <a:t>Callable, Future, </a:t>
-            </a:r>
-            <a:r>
-              <a:rPr lang="en-US" dirty="0" err="1"/>
-              <a:t>FutureTask</a:t>
-            </a:r>
-            <a:endParaRPr lang="en-US" dirty="0"/>
-          </a:p>
-          <a:p>
-            <a:r>
-              <a:rPr lang="en-US" dirty="0"/>
-              <a:t>Cancellation</a:t>
-            </a:r>
-          </a:p>
-          <a:p>
-            <a:endParaRPr lang="en-US" dirty="0"/>
-          </a:p>
-          <a:p>
-            <a:endParaRPr lang="en-US" dirty="0"/>
-          </a:p>
-          <a:p>
-            <a:endParaRPr lang="en-US" dirty="0"/>
-          </a:p>
-        </p:txBody>
-      </p:sp>
-      <p:cxnSp>
-        <p:nvCxnSpPr>
-          <p:cNvPr id="7" name="Straight Arrow Connector 6"/>
-          <p:cNvCxnSpPr/>
-          <p:nvPr/>
-        </p:nvCxnSpPr>
-        <p:spPr>
-          <a:xfrm rot="10800000">
-            <a:off x="1905000" y="1751011"/>
-            <a:ext cx="533400" cy="1588"/>
-          </a:xfrm>
-          <a:prstGeom prst="straightConnector1">
-            <a:avLst/>
-          </a:prstGeom>
-          <a:ln>
-            <a:tailEnd type="arrow"/>
-          </a:ln>
-        </p:spPr>
-        <p:style>
-          <a:lnRef idx="1">
-            <a:schemeClr val="accent1"/>
-          </a:lnRef>
-          <a:fillRef idx="0">
-            <a:schemeClr val="accent1"/>
-          </a:fillRef>
-          <a:effectRef idx="0">
-            <a:schemeClr val="accent1"/>
-          </a:effectRef>
-          <a:fontRef idx="minor">
-            <a:schemeClr val="tx1"/>
-          </a:fontRef>
-        </p:style>
-      </p:cxnSp>
+              <a:rPr lang="en-US" sz="1600" dirty="0" err="1">
+                <a:latin typeface="Arial" pitchFamily="34" charset="0"/>
+                <a:cs typeface="Arial" pitchFamily="34" charset="0"/>
+              </a:rPr>
+              <a:t>Thread.sleep</a:t>
+            </a:r>
+            <a:r>
+              <a:rPr lang="en-US" sz="1600" dirty="0">
+                <a:latin typeface="Arial" pitchFamily="34" charset="0"/>
+                <a:cs typeface="Arial" pitchFamily="34" charset="0"/>
+              </a:rPr>
+              <a:t> and nearly all other Java blocking methods support cancellation.</a:t>
+            </a:r>
+          </a:p>
+          <a:p>
+            <a:r>
+              <a:rPr lang="en-US" sz="1600" dirty="0">
+                <a:latin typeface="Arial" pitchFamily="34" charset="0"/>
+                <a:cs typeface="Arial" pitchFamily="34" charset="0"/>
+              </a:rPr>
+              <a:t>If your code is working on something, it is up to you to check for cancellation </a:t>
+            </a:r>
+          </a:p>
+          <a:p>
+            <a:r>
+              <a:rPr lang="en-US" sz="1600" dirty="0">
+                <a:latin typeface="Arial" pitchFamily="34" charset="0"/>
+                <a:cs typeface="Arial" pitchFamily="34" charset="0"/>
+              </a:rPr>
+              <a:t>(which means checking for interruption).</a:t>
+            </a:r>
+          </a:p>
+          <a:p>
+            <a:endParaRPr lang="en-US" sz="1600" dirty="0">
+              <a:latin typeface="Arial" pitchFamily="34" charset="0"/>
+              <a:cs typeface="Arial" pitchFamily="34" charset="0"/>
+            </a:endParaRPr>
+          </a:p>
+          <a:p>
+            <a:r>
+              <a:rPr lang="en-US" sz="1600" dirty="0">
+                <a:latin typeface="Arial" pitchFamily="34" charset="0"/>
+                <a:cs typeface="Arial" pitchFamily="34" charset="0"/>
+              </a:rPr>
+              <a:t>More on this on Chapter 7.</a:t>
+            </a:r>
+          </a:p>
+        </p:txBody>
+      </p:sp>
     </p:spTree>
   </p:cSld>
   <p:clrMapOvr>
     <a:masterClrMapping/>
   </p:clrMapOvr>
-  <p:timing>
-    <p:tnLst>
-      <p:par>
-        <p:cTn id="1" dur="indefinite" restart="never" nodeType="tmRoot"/>
-      </p:par>
-    </p:tnLst>
-  </p:timing>
 </p:sld>
 </file>
 
@@ -8665,7 +8311,7 @@
       </p:grpSpPr>
       <p:pic>
         <p:nvPicPr>
-          <p:cNvPr id="3074" name="Picture 2"/>
+          <p:cNvPr id="1026" name="Picture 2"/>
           <p:cNvPicPr>
             <a:picLocks noChangeAspect="1" noChangeArrowheads="1"/>
           </p:cNvPicPr>
@@ -8680,8 +8326,8 @@
         </p:blipFill>
         <p:spPr bwMode="auto">
           <a:xfrm>
-            <a:off x="276225" y="1914525"/>
-            <a:ext cx="8591550" cy="3028950"/>
+            <a:off x="76200" y="152400"/>
+            <a:ext cx="5381625" cy="6448425"/>
           </a:xfrm>
           <a:prstGeom prst="rect">
             <a:avLst/>
@@ -8695,16 +8341,48 @@
           </a:ln>
         </p:spPr>
       </p:pic>
-      <p:sp>
-        <p:nvSpPr>
-          <p:cNvPr id="5" name="TextBox 4"/>
+      <p:pic>
+        <p:nvPicPr>
+          <p:cNvPr id="1027" name="Picture 3"/>
+          <p:cNvPicPr>
+            <a:picLocks noChangeAspect="1" noChangeArrowheads="1"/>
+          </p:cNvPicPr>
+          <p:nvPr/>
+        </p:nvPicPr>
+        <p:blipFill>
+          <a:blip r:embed="rId3" cstate="print"/>
+          <a:srcRect/>
+          <a:stretch>
+            <a:fillRect/>
+          </a:stretch>
+        </p:blipFill>
+        <p:spPr bwMode="auto">
+          <a:xfrm>
+            <a:off x="4191000" y="4343400"/>
+            <a:ext cx="4724400" cy="1685549"/>
+          </a:xfrm>
+          <a:prstGeom prst="rect">
+            <a:avLst/>
+          </a:prstGeom>
+          <a:noFill/>
+          <a:ln w="9525">
+            <a:noFill/>
+            <a:miter lim="800000"/>
+            <a:headEnd/>
+            <a:tailEnd/>
+          </a:ln>
+        </p:spPr>
+      </p:pic>
+      <p:sp>
+        <p:nvSpPr>
+          <p:cNvPr id="7" name="TextBox 6"/>
           <p:cNvSpPr txBox="1"/>
           <p:nvPr/>
         </p:nvSpPr>
         <p:spPr>
           <a:xfrm>
-            <a:off x="381000" y="990600"/>
-            <a:ext cx="8172109" cy="646331"/>
+            <a:off x="4343400" y="1600200"/>
+            <a:ext cx="4838184" cy="1077218"/>
           </a:xfrm>
           <a:prstGeom prst="rect">
             <a:avLst/>
@@ -8718,30 +8396,140 @@
           <a:lstStyle/>
           <a:p>
             <a:r>
-              <a:rPr lang="en-US" dirty="0"/>
-              <a:t>Future also supports cancellation, but this is dependent upon the co-operation of the</a:t>
-            </a:r>
-          </a:p>
-          <a:p>
-            <a:r>
-              <a:rPr lang="en-US" dirty="0"/>
-              <a:t>running threads…</a:t>
-            </a:r>
-          </a:p>
-        </p:txBody>
-      </p:sp>
+              <a:rPr lang="en-US" sz="1600" dirty="0">
+                <a:latin typeface="Arial" pitchFamily="34" charset="0"/>
+                <a:cs typeface="Arial" pitchFamily="34" charset="0"/>
+              </a:rPr>
+              <a:t>Calling cancel causes an Interruption flag to be set.</a:t>
+            </a:r>
+          </a:p>
+          <a:p>
+            <a:r>
+              <a:rPr lang="en-US" sz="1600" dirty="0" err="1">
+                <a:latin typeface="Arial" pitchFamily="34" charset="0"/>
+                <a:cs typeface="Arial" pitchFamily="34" charset="0"/>
+              </a:rPr>
+              <a:t>Thread.sleep</a:t>
+            </a:r>
+            <a:r>
+              <a:rPr lang="en-US" sz="1600" dirty="0">
+                <a:latin typeface="Arial" pitchFamily="34" charset="0"/>
+                <a:cs typeface="Arial" pitchFamily="34" charset="0"/>
+              </a:rPr>
+              <a:t>(..) checks that interruption flag and</a:t>
+            </a:r>
+          </a:p>
+          <a:p>
+            <a:r>
+              <a:rPr lang="en-US" sz="1600" dirty="0">
+                <a:latin typeface="Arial" pitchFamily="34" charset="0"/>
+                <a:cs typeface="Arial" pitchFamily="34" charset="0"/>
+              </a:rPr>
+              <a:t>If it is set throws </a:t>
+            </a:r>
+            <a:r>
+              <a:rPr lang="en-US" sz="1600" dirty="0" err="1">
+                <a:latin typeface="Arial" pitchFamily="34" charset="0"/>
+                <a:cs typeface="Arial" pitchFamily="34" charset="0"/>
+              </a:rPr>
+              <a:t>InterruptedException</a:t>
+            </a:r>
+            <a:r>
+              <a:rPr lang="en-US" sz="1600" dirty="0">
+                <a:latin typeface="Arial" pitchFamily="34" charset="0"/>
+                <a:cs typeface="Arial" pitchFamily="34" charset="0"/>
+              </a:rPr>
+              <a:t>.</a:t>
+            </a:r>
+          </a:p>
+          <a:p>
+            <a:endParaRPr lang="en-US" sz="1600" dirty="0">
+              <a:latin typeface="Arial" pitchFamily="34" charset="0"/>
+              <a:cs typeface="Arial" pitchFamily="34" charset="0"/>
+            </a:endParaRPr>
+          </a:p>
+        </p:txBody>
+      </p:sp>
+      <p:sp>
+        <p:nvSpPr>
+          <p:cNvPr id="8" name="Rectangle 7"/>
+          <p:cNvSpPr/>
+          <p:nvPr/>
+        </p:nvSpPr>
+        <p:spPr>
+          <a:xfrm>
+            <a:off x="3581400" y="6172200"/>
+            <a:ext cx="5562600" cy="338554"/>
+          </a:xfrm>
+          <a:prstGeom prst="rect">
+            <a:avLst/>
+          </a:prstGeom>
+        </p:spPr>
+        <p:txBody>
+          <a:bodyPr wrap="square">
+            <a:spAutoFit/>
+          </a:bodyPr>
+          <a:lstStyle/>
+          <a:p>
+            <a:r>
+              <a:rPr lang="en-US" sz="1600" dirty="0">
+                <a:latin typeface="Arial" pitchFamily="34" charset="0"/>
+                <a:cs typeface="Arial" pitchFamily="34" charset="0"/>
+              </a:rPr>
+              <a:t>Calling get() after cancel, throws a </a:t>
+            </a:r>
+            <a:r>
+              <a:rPr lang="en-US" sz="1600" dirty="0" err="1">
+                <a:latin typeface="Arial" pitchFamily="34" charset="0"/>
+                <a:cs typeface="Arial" pitchFamily="34" charset="0"/>
+              </a:rPr>
+              <a:t>CancellationException</a:t>
+            </a:r>
+            <a:endParaRPr lang="en-US" sz="1600" dirty="0">
+              <a:latin typeface="Arial" pitchFamily="34" charset="0"/>
+              <a:cs typeface="Arial" pitchFamily="34" charset="0"/>
+            </a:endParaRPr>
+          </a:p>
+        </p:txBody>
+      </p:sp>
+      <p:cxnSp>
+        <p:nvCxnSpPr>
+          <p:cNvPr id="12" name="Straight Arrow Connector 11"/>
+          <p:cNvCxnSpPr/>
+          <p:nvPr/>
+        </p:nvCxnSpPr>
+        <p:spPr>
+          <a:xfrm rot="10800000">
+            <a:off x="3048000" y="6248400"/>
+            <a:ext cx="533400" cy="76200"/>
+          </a:xfrm>
+          <a:prstGeom prst="straightConnector1">
+            <a:avLst/>
+          </a:prstGeom>
+          <a:ln>
+            <a:tailEnd type="arrow"/>
+          </a:ln>
+        </p:spPr>
+        <p:style>
+          <a:lnRef idx="1">
+            <a:schemeClr val="accent1"/>
+          </a:lnRef>
+          <a:fillRef idx="0">
+            <a:schemeClr val="accent1"/>
+          </a:fillRef>
+          <a:effectRef idx="0">
+            <a:schemeClr val="accent1"/>
+          </a:effectRef>
+          <a:fontRef idx="minor">
+            <a:schemeClr val="tx1"/>
+          </a:fontRef>
+        </p:style>
+      </p:cxnSp>
     </p:spTree>
   </p:cSld>
   <p:clrMapOvr>
     <a:masterClrMapping/>
   </p:clrMapOvr>
-  <p:timing>
-    <p:tnLst>
-      <p:par>
-        <p:cTn id="1" dur="indefinite" restart="never" nodeType="tmRoot"/>
-      </p:par>
-    </p:tnLst>
-  </p:timing>
 </p:sld>
 </file>
 
@@ -9093,13 +8881,6 @@
   <p:clrMapOvr>
     <a:masterClrMapping/>
   </p:clrMapOvr>
-  <p:timing>
-    <p:tnLst>
-      <p:par>
-        <p:cTn id="1" dur="indefinite" restart="never" nodeType="tmRoot"/>
-      </p:par>
-    </p:tnLst>
-  </p:timing>
 </p:sld>
 </file>
 
@@ -9122,7 +8903,7 @@
       </p:grpSpPr>
       <p:pic>
         <p:nvPicPr>
-          <p:cNvPr id="1026" name="Picture 2"/>
+          <p:cNvPr id="4098" name="Picture 2"/>
           <p:cNvPicPr>
             <a:picLocks noChangeAspect="1" noChangeArrowheads="1"/>
           </p:cNvPicPr>
@@ -9137,8 +8918,8 @@
         </p:blipFill>
         <p:spPr bwMode="auto">
           <a:xfrm>
-            <a:off x="314325" y="2047875"/>
-            <a:ext cx="8515350" cy="2762250"/>
+            <a:off x="1066800" y="2057400"/>
+            <a:ext cx="6911738" cy="2819400"/>
           </a:xfrm>
           <a:prstGeom prst="rect">
             <a:avLst/>
@@ -9152,90 +8933,11 @@
           </a:ln>
         </p:spPr>
       </p:pic>
-      <p:sp>
-        <p:nvSpPr>
-          <p:cNvPr id="3" name="TextBox 2"/>
-          <p:cNvSpPr txBox="1"/>
-          <p:nvPr/>
-        </p:nvSpPr>
-        <p:spPr>
-          <a:xfrm>
-            <a:off x="457200" y="218182"/>
-            <a:ext cx="7620000" cy="1323439"/>
-          </a:xfrm>
-          <a:prstGeom prst="rect">
-            <a:avLst/>
-          </a:prstGeom>
-          <a:noFill/>
-        </p:spPr>
-        <p:txBody>
-          <a:bodyPr wrap="square" rtlCol="0">
-            <a:spAutoFit/>
-          </a:bodyPr>
-          <a:lstStyle/>
-          <a:p>
-            <a:r>
-              <a:rPr lang="en-US" sz="1600" dirty="0" err="1">
-                <a:latin typeface="Arial" pitchFamily="34" charset="0"/>
-                <a:cs typeface="Arial" pitchFamily="34" charset="0"/>
-              </a:rPr>
-              <a:t>Thread.sleep</a:t>
-            </a:r>
-            <a:r>
-              <a:rPr lang="en-US" sz="1600" dirty="0">
-                <a:latin typeface="Arial" pitchFamily="34" charset="0"/>
-                <a:cs typeface="Arial" pitchFamily="34" charset="0"/>
-              </a:rPr>
-              <a:t> and nearly all other Java blocking methods support cancellation.</a:t>
-            </a:r>
-          </a:p>
-          <a:p>
-            <a:r>
-              <a:rPr lang="en-US" sz="1600" dirty="0">
-                <a:latin typeface="Arial" pitchFamily="34" charset="0"/>
-                <a:cs typeface="Arial" pitchFamily="34" charset="0"/>
-              </a:rPr>
-              <a:t>If your code is working on something, it is up to you to check for cancellation </a:t>
-            </a:r>
-          </a:p>
-          <a:p>
-            <a:r>
-              <a:rPr lang="en-US" sz="1600" dirty="0">
-                <a:latin typeface="Arial" pitchFamily="34" charset="0"/>
-                <a:cs typeface="Arial" pitchFamily="34" charset="0"/>
-              </a:rPr>
-              <a:t>(which means checking for interruption).</a:t>
-            </a:r>
-          </a:p>
-          <a:p>
-            <a:endParaRPr lang="en-US" sz="1600" dirty="0">
-              <a:latin typeface="Arial" pitchFamily="34" charset="0"/>
-              <a:cs typeface="Arial" pitchFamily="34" charset="0"/>
-            </a:endParaRPr>
-          </a:p>
-          <a:p>
-            <a:r>
-              <a:rPr lang="en-US" sz="1600" dirty="0">
-                <a:latin typeface="Arial" pitchFamily="34" charset="0"/>
-                <a:cs typeface="Arial" pitchFamily="34" charset="0"/>
-              </a:rPr>
-              <a:t>More on this on Chapter 7.</a:t>
-            </a:r>
-          </a:p>
-        </p:txBody>
-      </p:sp>
     </p:spTree>
   </p:cSld>
   <p:clrMapOvr>
     <a:masterClrMapping/>
   </p:clrMapOvr>
-  <p:timing>
-    <p:tnLst>
-      <p:par>
-        <p:cTn id="1" dur="indefinite" restart="never" nodeType="tmRoot"/>
-      </p:par>
-    </p:tnLst>
-  </p:timing>
 </p:sld>
 </file>
 
@@ -9258,7 +8960,7 @@
       </p:grpSpPr>
       <p:pic>
         <p:nvPicPr>
-          <p:cNvPr id="1026" name="Picture 2"/>
+          <p:cNvPr id="2050" name="Picture 2"/>
           <p:cNvPicPr>
             <a:picLocks noChangeAspect="1" noChangeArrowheads="1"/>
           </p:cNvPicPr>
@@ -9273,8 +8975,8 @@
         </p:blipFill>
         <p:spPr bwMode="auto">
           <a:xfrm>
-            <a:off x="76200" y="152400"/>
-            <a:ext cx="5381625" cy="6448425"/>
+            <a:off x="228600" y="76200"/>
+            <a:ext cx="5773994" cy="6629400"/>
           </a:xfrm>
           <a:prstGeom prst="rect">
             <a:avLst/>
@@ -9288,167 +8990,53 @@
           </a:ln>
         </p:spPr>
       </p:pic>
-      <p:pic>
-        <p:nvPicPr>
-          <p:cNvPr id="1027" name="Picture 3"/>
-          <p:cNvPicPr>
-            <a:picLocks noChangeAspect="1" noChangeArrowheads="1"/>
-          </p:cNvPicPr>
-          <p:nvPr/>
-        </p:nvPicPr>
-        <p:blipFill>
-          <a:blip r:embed="rId3" cstate="print"/>
-          <a:srcRect/>
-          <a:stretch>
-            <a:fillRect/>
-          </a:stretch>
-        </p:blipFill>
-        <p:spPr bwMode="auto">
-          <a:xfrm>
-            <a:off x="4191000" y="4343400"/>
-            <a:ext cx="4724400" cy="1685549"/>
+      <p:sp>
+        <p:nvSpPr>
+          <p:cNvPr id="5" name="TextBox 4"/>
+          <p:cNvSpPr txBox="1"/>
+          <p:nvPr/>
+        </p:nvSpPr>
+        <p:spPr>
+          <a:xfrm>
+            <a:off x="5029200" y="381000"/>
+            <a:ext cx="4004966" cy="1200329"/>
           </a:xfrm>
           <a:prstGeom prst="rect">
             <a:avLst/>
           </a:prstGeom>
           <a:noFill/>
-          <a:ln w="9525">
-            <a:noFill/>
-            <a:miter lim="800000"/>
-            <a:headEnd/>
-            <a:tailEnd/>
-          </a:ln>
-        </p:spPr>
-      </p:pic>
-      <p:sp>
-        <p:nvSpPr>
-          <p:cNvPr id="7" name="TextBox 6"/>
-          <p:cNvSpPr txBox="1"/>
-          <p:nvPr/>
-        </p:nvSpPr>
-        <p:spPr>
-          <a:xfrm>
-            <a:off x="4343400" y="1600200"/>
-            <a:ext cx="4838184" cy="1077218"/>
-          </a:xfrm>
-          <a:prstGeom prst="rect">
-            <a:avLst/>
-          </a:prstGeom>
-          <a:noFill/>
-        </p:spPr>
-        <p:txBody>
-          <a:bodyPr wrap="none" rtlCol="0">
+        </p:spPr>
+        <p:txBody>
+          <a:bodyPr wrap="square" rtlCol="0">
             <a:spAutoFit/>
           </a:bodyPr>
           <a:lstStyle/>
           <a:p>
             <a:r>
-              <a:rPr lang="en-US" sz="1600" dirty="0">
-                <a:latin typeface="Arial" pitchFamily="34" charset="0"/>
-                <a:cs typeface="Arial" pitchFamily="34" charset="0"/>
-              </a:rPr>
-              <a:t>Calling cancel causes an Interruption flag to be set.</a:t>
-            </a:r>
-          </a:p>
-          <a:p>
-            <a:r>
-              <a:rPr lang="en-US" sz="1600" dirty="0" err="1">
-                <a:latin typeface="Arial" pitchFamily="34" charset="0"/>
-                <a:cs typeface="Arial" pitchFamily="34" charset="0"/>
-              </a:rPr>
+              <a:rPr lang="en-US" dirty="0"/>
+              <a:t>If you are not using one of Java’s  blocking methods (like </a:t>
+            </a:r>
+            <a:r>
+              <a:rPr lang="en-US" dirty="0" err="1"/>
               <a:t>Thread.sleep</a:t>
             </a:r>
             <a:r>
-              <a:rPr lang="en-US" sz="1600" dirty="0">
-                <a:latin typeface="Arial" pitchFamily="34" charset="0"/>
-                <a:cs typeface="Arial" pitchFamily="34" charset="0"/>
-              </a:rPr>
-              <a:t>(..) checks that interruption flag and</a:t>
-            </a:r>
-          </a:p>
-          <a:p>
-            <a:r>
-              <a:rPr lang="en-US" sz="1600" dirty="0">
-                <a:latin typeface="Arial" pitchFamily="34" charset="0"/>
-                <a:cs typeface="Arial" pitchFamily="34" charset="0"/>
-              </a:rPr>
-              <a:t>If it is set throws </a:t>
-            </a:r>
-            <a:r>
-              <a:rPr lang="en-US" sz="1600" dirty="0" err="1">
-                <a:latin typeface="Arial" pitchFamily="34" charset="0"/>
-                <a:cs typeface="Arial" pitchFamily="34" charset="0"/>
-              </a:rPr>
-              <a:t>InterruptedException</a:t>
-            </a:r>
-            <a:r>
-              <a:rPr lang="en-US" sz="1600" dirty="0">
-                <a:latin typeface="Arial" pitchFamily="34" charset="0"/>
-                <a:cs typeface="Arial" pitchFamily="34" charset="0"/>
-              </a:rPr>
-              <a:t>.</a:t>
-            </a:r>
-          </a:p>
-          <a:p>
-            <a:endParaRPr lang="en-US" sz="1600" dirty="0">
-              <a:latin typeface="Arial" pitchFamily="34" charset="0"/>
-              <a:cs typeface="Arial" pitchFamily="34" charset="0"/>
-            </a:endParaRPr>
-          </a:p>
-        </p:txBody>
-      </p:sp>
-      <p:sp>
-        <p:nvSpPr>
-          <p:cNvPr id="8" name="Rectangle 7"/>
-          <p:cNvSpPr/>
-          <p:nvPr/>
-        </p:nvSpPr>
-        <p:spPr>
-          <a:xfrm>
-            <a:off x="3581400" y="6172200"/>
-            <a:ext cx="5562600" cy="338554"/>
-          </a:xfrm>
-          <a:prstGeom prst="rect">
-            <a:avLst/>
-          </a:prstGeom>
-        </p:spPr>
-        <p:txBody>
-          <a:bodyPr wrap="square">
-            <a:spAutoFit/>
-          </a:bodyPr>
-          <a:lstStyle/>
-          <a:p>
-            <a:r>
-              <a:rPr lang="en-US" sz="1600" dirty="0">
-                <a:latin typeface="Arial" pitchFamily="34" charset="0"/>
-                <a:cs typeface="Arial" pitchFamily="34" charset="0"/>
-              </a:rPr>
-              <a:t>Calling get() after cancel, throws a </a:t>
-            </a:r>
-            <a:r>
-              <a:rPr lang="en-US" sz="1600" dirty="0" err="1">
-                <a:latin typeface="Arial" pitchFamily="34" charset="0"/>
-                <a:cs typeface="Arial" pitchFamily="34" charset="0"/>
-              </a:rPr>
-              <a:t>CancellationException</a:t>
-            </a:r>
-            <a:endParaRPr lang="en-US" sz="1600" dirty="0">
-              <a:latin typeface="Arial" pitchFamily="34" charset="0"/>
-              <a:cs typeface="Arial" pitchFamily="34" charset="0"/>
-            </a:endParaRPr>
+              <a:rPr lang="en-US" dirty="0"/>
+              <a:t>()) that supports interruption, it is up to you to check for cancellation.</a:t>
+            </a:r>
           </a:p>
         </p:txBody>
       </p:sp>
       <p:cxnSp>
         <p:nvCxnSpPr>
-          <p:cNvPr id="12" name="Straight Arrow Connector 11"/>
+          <p:cNvPr id="7" name="Straight Arrow Connector 6"/>
           <p:cNvCxnSpPr/>
           <p:nvPr/>
         </p:nvCxnSpPr>
         <p:spPr>
           <a:xfrm rot="10800000">
-            <a:off x="3048000" y="6248400"/>
-            <a:ext cx="533400" cy="76200"/>
+            <a:off x="4038600" y="2133600"/>
+            <a:ext cx="609600" cy="1588"/>
           </a:xfrm>
           <a:prstGeom prst="straightConnector1">
             <a:avLst/>
@@ -9472,18 +9060,167 @@
           </a:fontRef>
         </p:style>
       </p:cxnSp>
+      <p:sp>
+        <p:nvSpPr>
+          <p:cNvPr id="9" name="TextBox 8"/>
+          <p:cNvSpPr txBox="1"/>
+          <p:nvPr/>
+        </p:nvSpPr>
+        <p:spPr>
+          <a:xfrm>
+            <a:off x="4572000" y="1916668"/>
+            <a:ext cx="3142463" cy="369332"/>
+          </a:xfrm>
+          <a:prstGeom prst="rect">
+            <a:avLst/>
+          </a:prstGeom>
+          <a:noFill/>
+        </p:spPr>
+        <p:txBody>
+          <a:bodyPr wrap="none" rtlCol="0">
+            <a:spAutoFit/>
+          </a:bodyPr>
+          <a:lstStyle/>
+          <a:p>
+            <a:r>
+              <a:rPr lang="en-US" dirty="0"/>
+              <a:t>We don’t check for cancellation</a:t>
+            </a:r>
+          </a:p>
+        </p:txBody>
+      </p:sp>
+      <p:pic>
+        <p:nvPicPr>
+          <p:cNvPr id="2051" name="Picture 3"/>
+          <p:cNvPicPr>
+            <a:picLocks noChangeAspect="1" noChangeArrowheads="1"/>
+          </p:cNvPicPr>
+          <p:nvPr/>
+        </p:nvPicPr>
+        <p:blipFill>
+          <a:blip r:embed="rId3" cstate="print"/>
+          <a:srcRect/>
+          <a:stretch>
+            <a:fillRect/>
+          </a:stretch>
+        </p:blipFill>
+        <p:spPr bwMode="auto">
+          <a:xfrm>
+            <a:off x="3993614" y="4267200"/>
+            <a:ext cx="5150386" cy="1524000"/>
+          </a:xfrm>
+          <a:prstGeom prst="rect">
+            <a:avLst/>
+          </a:prstGeom>
+          <a:noFill/>
+          <a:ln w="9525">
+            <a:noFill/>
+            <a:miter lim="800000"/>
+            <a:headEnd/>
+            <a:tailEnd/>
+          </a:ln>
+        </p:spPr>
+      </p:pic>
+      <p:sp>
+        <p:nvSpPr>
+          <p:cNvPr id="11" name="TextBox 10"/>
+          <p:cNvSpPr txBox="1"/>
+          <p:nvPr/>
+        </p:nvSpPr>
+        <p:spPr>
+          <a:xfrm>
+            <a:off x="4114800" y="3962400"/>
+            <a:ext cx="4673011" cy="369332"/>
+          </a:xfrm>
+          <a:prstGeom prst="rect">
+            <a:avLst/>
+          </a:prstGeom>
+          <a:noFill/>
+        </p:spPr>
+        <p:txBody>
+          <a:bodyPr wrap="none" rtlCol="0">
+            <a:spAutoFit/>
+          </a:bodyPr>
+          <a:lstStyle/>
+          <a:p>
+            <a:r>
+              <a:rPr lang="en-US" dirty="0"/>
+              <a:t>Our thread continued to work after cancellation</a:t>
+            </a:r>
+          </a:p>
+        </p:txBody>
+      </p:sp>
+      <p:cxnSp>
+        <p:nvCxnSpPr>
+          <p:cNvPr id="13" name="Straight Arrow Connector 12"/>
+          <p:cNvCxnSpPr/>
+          <p:nvPr/>
+        </p:nvCxnSpPr>
+        <p:spPr>
+          <a:xfrm rot="10800000">
+            <a:off x="3505200" y="6324600"/>
+            <a:ext cx="685800" cy="1588"/>
+          </a:xfrm>
+          <a:prstGeom prst="straightConnector1">
+            <a:avLst/>
+          </a:prstGeom>
+          <a:ln>
+            <a:tailEnd type="arrow"/>
+          </a:ln>
+        </p:spPr>
+        <p:style>
+          <a:lnRef idx="1">
+            <a:schemeClr val="accent1"/>
+          </a:lnRef>
+          <a:fillRef idx="0">
+            <a:schemeClr val="accent1"/>
+          </a:fillRef>
+          <a:effectRef idx="0">
+            <a:schemeClr val="accent1"/>
+          </a:effectRef>
+          <a:fontRef idx="minor">
+            <a:schemeClr val="tx1"/>
+          </a:fontRef>
+        </p:style>
+      </p:cxnSp>
+      <p:sp>
+        <p:nvSpPr>
+          <p:cNvPr id="14" name="TextBox 13"/>
+          <p:cNvSpPr txBox="1"/>
+          <p:nvPr/>
+        </p:nvSpPr>
+        <p:spPr>
+          <a:xfrm>
+            <a:off x="4191000" y="6172200"/>
+            <a:ext cx="1688732" cy="369332"/>
+          </a:xfrm>
+          <a:prstGeom prst="rect">
+            <a:avLst/>
+          </a:prstGeom>
+          <a:noFill/>
+        </p:spPr>
+        <p:txBody>
+          <a:bodyPr wrap="none" rtlCol="0">
+            <a:spAutoFit/>
+          </a:bodyPr>
+          <a:lstStyle/>
+          <a:p>
+            <a:r>
+              <a:rPr lang="en-US" dirty="0"/>
+              <a:t>get </a:t>
+            </a:r>
+            <a:r>
+              <a:rPr lang="en-US"/>
+              <a:t>still  throws!</a:t>
+            </a:r>
+          </a:p>
+        </p:txBody>
+      </p:sp>
     </p:spTree>
   </p:cSld>
   <p:clrMapOvr>
     <a:masterClrMapping/>
   </p:clrMapOvr>
-  <p:timing>
-    <p:tnLst>
-      <p:par>
-        <p:cTn id="1" dur="indefinite" restart="never" nodeType="tmRoot"/>
-      </p:par>
-    </p:tnLst>
-  </p:timing>
 </p:sld>
 </file>
 
@@ -9506,7 +9243,7 @@
       </p:grpSpPr>
       <p:pic>
         <p:nvPicPr>
-          <p:cNvPr id="4098" name="Picture 2"/>
+          <p:cNvPr id="1027" name="Picture 3"/>
           <p:cNvPicPr>
             <a:picLocks noChangeAspect="1" noChangeArrowheads="1"/>
           </p:cNvPicPr>
@@ -9521,8 +9258,8 @@
         </p:blipFill>
         <p:spPr bwMode="auto">
           <a:xfrm>
-            <a:off x="1066800" y="2057400"/>
-            <a:ext cx="6911738" cy="2819400"/>
+            <a:off x="457200" y="304800"/>
+            <a:ext cx="5112774" cy="6400800"/>
           </a:xfrm>
           <a:prstGeom prst="rect">
             <a:avLst/>
@@ -9536,18 +9273,134 @@
           </a:ln>
         </p:spPr>
       </p:pic>
+      <p:cxnSp>
+        <p:nvCxnSpPr>
+          <p:cNvPr id="5" name="Straight Arrow Connector 4"/>
+          <p:cNvCxnSpPr/>
+          <p:nvPr/>
+        </p:nvCxnSpPr>
+        <p:spPr>
+          <a:xfrm rot="10800000">
+            <a:off x="3886200" y="2132011"/>
+            <a:ext cx="838200" cy="1588"/>
+          </a:xfrm>
+          <a:prstGeom prst="straightConnector1">
+            <a:avLst/>
+          </a:prstGeom>
+          <a:ln>
+            <a:tailEnd type="arrow"/>
+          </a:ln>
+        </p:spPr>
+        <p:style>
+          <a:lnRef idx="1">
+            <a:schemeClr val="accent1"/>
+          </a:lnRef>
+          <a:fillRef idx="0">
+            <a:schemeClr val="accent1"/>
+          </a:fillRef>
+          <a:effectRef idx="0">
+            <a:schemeClr val="accent1"/>
+          </a:effectRef>
+          <a:fontRef idx="minor">
+            <a:schemeClr val="tx1"/>
+          </a:fontRef>
+        </p:style>
+      </p:cxnSp>
+      <p:sp>
+        <p:nvSpPr>
+          <p:cNvPr id="6" name="TextBox 5"/>
+          <p:cNvSpPr txBox="1"/>
+          <p:nvPr/>
+        </p:nvSpPr>
+        <p:spPr>
+          <a:xfrm>
+            <a:off x="5410200" y="533400"/>
+            <a:ext cx="2791598" cy="369332"/>
+          </a:xfrm>
+          <a:prstGeom prst="rect">
+            <a:avLst/>
+          </a:prstGeom>
+          <a:noFill/>
+        </p:spPr>
+        <p:txBody>
+          <a:bodyPr wrap="none" rtlCol="0">
+            <a:spAutoFit/>
+          </a:bodyPr>
+          <a:lstStyle/>
+          <a:p>
+            <a:r>
+              <a:rPr lang="en-US" dirty="0"/>
+              <a:t>Our cancellation now works</a:t>
+            </a:r>
+          </a:p>
+        </p:txBody>
+      </p:sp>
+      <p:pic>
+        <p:nvPicPr>
+          <p:cNvPr id="1028" name="Picture 4"/>
+          <p:cNvPicPr>
+            <a:picLocks noChangeAspect="1" noChangeArrowheads="1"/>
+          </p:cNvPicPr>
+          <p:nvPr/>
+        </p:nvPicPr>
+        <p:blipFill>
+          <a:blip r:embed="rId3" cstate="print"/>
+          <a:srcRect/>
+          <a:stretch>
+            <a:fillRect/>
+          </a:stretch>
+        </p:blipFill>
+        <p:spPr bwMode="auto">
+          <a:xfrm>
+            <a:off x="3810000" y="4419600"/>
+            <a:ext cx="5124450" cy="1480594"/>
+          </a:xfrm>
+          <a:prstGeom prst="rect">
+            <a:avLst/>
+          </a:prstGeom>
+          <a:noFill/>
+          <a:ln w="9525">
+            <a:noFill/>
+            <a:miter lim="800000"/>
+            <a:headEnd/>
+            <a:tailEnd/>
+          </a:ln>
+        </p:spPr>
+      </p:pic>
+      <p:sp>
+        <p:nvSpPr>
+          <p:cNvPr id="8" name="TextBox 7"/>
+          <p:cNvSpPr txBox="1"/>
+          <p:nvPr/>
+        </p:nvSpPr>
+        <p:spPr>
+          <a:xfrm>
+            <a:off x="4114800" y="5943600"/>
+            <a:ext cx="4800600" cy="646331"/>
+          </a:xfrm>
+          <a:prstGeom prst="rect">
+            <a:avLst/>
+          </a:prstGeom>
+          <a:noFill/>
+        </p:spPr>
+        <p:txBody>
+          <a:bodyPr wrap="square" rtlCol="0">
+            <a:spAutoFit/>
+          </a:bodyPr>
+          <a:lstStyle/>
+          <a:p>
+            <a:r>
+              <a:rPr lang="en-US" dirty="0"/>
+              <a:t>The thread is successfully cancelled.  “end work” is not reached</a:t>
+            </a:r>
+          </a:p>
+        </p:txBody>
+      </p:sp>
     </p:spTree>
   </p:cSld>
   <p:clrMapOvr>
     <a:masterClrMapping/>
   </p:clrMapOvr>
-  <p:timing>
-    <p:tnLst>
-      <p:par>
-        <p:cTn id="1" dur="indefinite" restart="never" nodeType="tmRoot"/>
-      </p:par>
-    </p:tnLst>
-  </p:timing>
 </p:sld>
 </file>
 
@@ -9570,7 +9423,7 @@
       </p:grpSpPr>
       <p:pic>
         <p:nvPicPr>
-          <p:cNvPr id="2050" name="Picture 2"/>
+          <p:cNvPr id="3074" name="Picture 2"/>
           <p:cNvPicPr>
             <a:picLocks noChangeAspect="1" noChangeArrowheads="1"/>
           </p:cNvPicPr>
@@ -9585,8 +9438,8 @@
         </p:blipFill>
         <p:spPr bwMode="auto">
           <a:xfrm>
-            <a:off x="228600" y="76200"/>
-            <a:ext cx="5773994" cy="6629400"/>
+            <a:off x="228600" y="0"/>
+            <a:ext cx="4791075" cy="4000500"/>
           </a:xfrm>
           <a:prstGeom prst="rect">
             <a:avLst/>
@@ -9600,16 +9453,48 @@
           </a:ln>
         </p:spPr>
       </p:pic>
-      <p:sp>
-        <p:nvSpPr>
-          <p:cNvPr id="5" name="TextBox 4"/>
+      <p:pic>
+        <p:nvPicPr>
+          <p:cNvPr id="3075" name="Picture 3"/>
+          <p:cNvPicPr>
+            <a:picLocks noChangeAspect="1" noChangeArrowheads="1"/>
+          </p:cNvPicPr>
+          <p:nvPr/>
+        </p:nvPicPr>
+        <p:blipFill>
+          <a:blip r:embed="rId3" cstate="print"/>
+          <a:srcRect/>
+          <a:stretch>
+            <a:fillRect/>
+          </a:stretch>
+        </p:blipFill>
+        <p:spPr bwMode="auto">
+          <a:xfrm>
+            <a:off x="457200" y="4191000"/>
+            <a:ext cx="3947448" cy="2438400"/>
+          </a:xfrm>
+          <a:prstGeom prst="rect">
+            <a:avLst/>
+          </a:prstGeom>
+          <a:noFill/>
+          <a:ln w="9525">
+            <a:noFill/>
+            <a:miter lim="800000"/>
+            <a:headEnd/>
+            <a:tailEnd/>
+          </a:ln>
+        </p:spPr>
+      </p:pic>
+      <p:sp>
+        <p:nvSpPr>
+          <p:cNvPr id="7" name="TextBox 6"/>
           <p:cNvSpPr txBox="1"/>
           <p:nvPr/>
         </p:nvSpPr>
         <p:spPr>
           <a:xfrm>
-            <a:off x="5029200" y="381000"/>
-            <a:ext cx="4004966" cy="1200329"/>
+            <a:off x="4800600" y="762000"/>
+            <a:ext cx="3834961" cy="646331"/>
           </a:xfrm>
           <a:prstGeom prst="rect">
             <a:avLst/>
@@ -9617,35 +9502,41 @@
           <a:noFill/>
         </p:spPr>
         <p:txBody>
-          <a:bodyPr wrap="square" rtlCol="0">
+          <a:bodyPr wrap="none" rtlCol="0">
             <a:spAutoFit/>
           </a:bodyPr>
           <a:lstStyle/>
           <a:p>
             <a:r>
               <a:rPr lang="en-US" dirty="0"/>
-              <a:t>If you are not using one of Java’s  blocking methods (like </a:t>
+              <a:t>If we throw a normal</a:t>
+            </a:r>
+          </a:p>
+          <a:p>
+            <a:r>
+              <a:rPr lang="en-US" dirty="0"/>
+              <a:t>Exception (not </a:t>
             </a:r>
             <a:r>
               <a:rPr lang="en-US" dirty="0" err="1"/>
-              <a:t>Thread.sleep</a:t>
+              <a:t>InterruptedException</a:t>
             </a:r>
             <a:r>
               <a:rPr lang="en-US" dirty="0"/>
-              <a:t>()) that supports interruption, it is up to you to check for cancellation.</a:t>
+              <a:t>)…</a:t>
             </a:r>
           </a:p>
         </p:txBody>
       </p:sp>
       <p:cxnSp>
         <p:nvCxnSpPr>
-          <p:cNvPr id="7" name="Straight Arrow Connector 6"/>
+          <p:cNvPr id="9" name="Straight Arrow Connector 8"/>
           <p:cNvCxnSpPr/>
           <p:nvPr/>
         </p:nvCxnSpPr>
         <p:spPr>
           <a:xfrm rot="10800000">
-            <a:off x="4038600" y="2133600"/>
+            <a:off x="2971800" y="6400800"/>
             <a:ext cx="609600" cy="1588"/>
           </a:xfrm>
           <a:prstGeom prst="straightConnector1">
@@ -9672,14 +9563,14 @@
       </p:cxnSp>
       <p:sp>
         <p:nvSpPr>
-          <p:cNvPr id="9" name="TextBox 8"/>
+          <p:cNvPr id="10" name="TextBox 9"/>
           <p:cNvSpPr txBox="1"/>
           <p:nvPr/>
         </p:nvSpPr>
         <p:spPr>
           <a:xfrm>
-            <a:off x="4572000" y="1916668"/>
-            <a:ext cx="3142463" cy="369332"/>
+            <a:off x="3657600" y="6248400"/>
+            <a:ext cx="4114800" cy="369332"/>
           </a:xfrm>
           <a:prstGeom prst="rect">
             <a:avLst/>
@@ -9687,28 +9578,33 @@
           <a:noFill/>
         </p:spPr>
         <p:txBody>
-          <a:bodyPr wrap="none" rtlCol="0">
+          <a:bodyPr wrap="square" rtlCol="0">
             <a:spAutoFit/>
           </a:bodyPr>
           <a:lstStyle/>
           <a:p>
             <a:r>
               <a:rPr lang="en-US" dirty="0"/>
-              <a:t>We don’t check for cancellation</a:t>
-            </a:r>
+              <a:t>Then get re-throws </a:t>
+            </a:r>
+            <a:r>
+              <a:rPr lang="en-US"/>
+              <a:t>that Exception   </a:t>
+            </a:r>
+            <a:endParaRPr lang="en-US" dirty="0"/>
           </a:p>
         </p:txBody>
       </p:sp>
       <p:pic>
         <p:nvPicPr>
-          <p:cNvPr id="2051" name="Picture 3"/>
+          <p:cNvPr id="3076" name="Picture 4"/>
           <p:cNvPicPr>
             <a:picLocks noChangeAspect="1" noChangeArrowheads="1"/>
           </p:cNvPicPr>
           <p:nvPr/>
         </p:nvPicPr>
         <p:blipFill>
-          <a:blip r:embed="rId3" cstate="print"/>
+          <a:blip r:embed="rId4" cstate="print"/>
           <a:srcRect/>
           <a:stretch>
             <a:fillRect/>
@@ -9716,8 +9612,8 @@
         </p:blipFill>
         <p:spPr bwMode="auto">
           <a:xfrm>
-            <a:off x="3993614" y="4267200"/>
-            <a:ext cx="5150386" cy="1524000"/>
+            <a:off x="3954483" y="4419600"/>
+            <a:ext cx="5189517" cy="1752600"/>
           </a:xfrm>
           <a:prstGeom prst="rect">
             <a:avLst/>
@@ -9731,113 +9627,11 @@
           </a:ln>
         </p:spPr>
       </p:pic>
-      <p:sp>
-        <p:nvSpPr>
-          <p:cNvPr id="11" name="TextBox 10"/>
-          <p:cNvSpPr txBox="1"/>
-          <p:nvPr/>
-        </p:nvSpPr>
-        <p:spPr>
-          <a:xfrm>
-            <a:off x="4114800" y="3962400"/>
-            <a:ext cx="4673011" cy="369332"/>
-          </a:xfrm>
-          <a:prstGeom prst="rect">
-            <a:avLst/>
-          </a:prstGeom>
-          <a:noFill/>
-        </p:spPr>
-        <p:txBody>
-          <a:bodyPr wrap="none" rtlCol="0">
-            <a:spAutoFit/>
-          </a:bodyPr>
-          <a:lstStyle/>
-          <a:p>
-            <a:r>
-              <a:rPr lang="en-US" dirty="0"/>
-              <a:t>Our thread continued to work after cancellation</a:t>
-            </a:r>
-          </a:p>
-        </p:txBody>
-      </p:sp>
-      <p:cxnSp>
-        <p:nvCxnSpPr>
-          <p:cNvPr id="13" name="Straight Arrow Connector 12"/>
-          <p:cNvCxnSpPr/>
-          <p:nvPr/>
-        </p:nvCxnSpPr>
-        <p:spPr>
-          <a:xfrm rot="10800000">
-            <a:off x="3505200" y="6324600"/>
-            <a:ext cx="685800" cy="1588"/>
-          </a:xfrm>
-          <a:prstGeom prst="straightConnector1">
-            <a:avLst/>
-          </a:prstGeom>
-          <a:ln>
-            <a:tailEnd type="arrow"/>
-          </a:ln>
-        </p:spPr>
-        <p:style>
-          <a:lnRef idx="1">
-            <a:schemeClr val="accent1"/>
-          </a:lnRef>
-          <a:fillRef idx="0">
-            <a:schemeClr val="accent1"/>
-          </a:fillRef>
-          <a:effectRef idx="0">
-            <a:schemeClr val="accent1"/>
-          </a:effectRef>
-          <a:fontRef idx="minor">
-            <a:schemeClr val="tx1"/>
-          </a:fontRef>
-        </p:style>
-      </p:cxnSp>
-      <p:sp>
-        <p:nvSpPr>
-          <p:cNvPr id="14" name="TextBox 13"/>
-          <p:cNvSpPr txBox="1"/>
-          <p:nvPr/>
-        </p:nvSpPr>
-        <p:spPr>
-          <a:xfrm>
-            <a:off x="4191000" y="6172200"/>
-            <a:ext cx="1688732" cy="369332"/>
-          </a:xfrm>
-          <a:prstGeom prst="rect">
-            <a:avLst/>
-          </a:prstGeom>
-          <a:noFill/>
-        </p:spPr>
-        <p:txBody>
-          <a:bodyPr wrap="none" rtlCol="0">
-            <a:spAutoFit/>
-          </a:bodyPr>
-          <a:lstStyle/>
-          <a:p>
-            <a:r>
-              <a:rPr lang="en-US" dirty="0"/>
-              <a:t>get </a:t>
-            </a:r>
-            <a:r>
-              <a:rPr lang="en-US"/>
-              <a:t>still  throws!</a:t>
-            </a:r>
-          </a:p>
-        </p:txBody>
-      </p:sp>
     </p:spTree>
   </p:cSld>
   <p:clrMapOvr>
     <a:masterClrMapping/>
   </p:clrMapOvr>
-  <p:timing>
-    <p:tnLst>
-      <p:par>
-        <p:cTn id="1" dur="indefinite" restart="never" nodeType="tmRoot"/>
-      </p:par>
-    </p:tnLst>
-  </p:timing>
 </p:sld>
 </file>
 
@@ -9858,431 +9652,6 @@
           <a:chExt cx="0" cy="0"/>
         </a:xfrm>
       </p:grpSpPr>
-      <p:pic>
-        <p:nvPicPr>
-          <p:cNvPr id="1027" name="Picture 3"/>
-          <p:cNvPicPr>
-            <a:picLocks noChangeAspect="1" noChangeArrowheads="1"/>
-          </p:cNvPicPr>
-          <p:nvPr/>
-        </p:nvPicPr>
-        <p:blipFill>
-          <a:blip r:embed="rId2" cstate="print"/>
-          <a:srcRect/>
-          <a:stretch>
-            <a:fillRect/>
-          </a:stretch>
-        </p:blipFill>
-        <p:spPr bwMode="auto">
-          <a:xfrm>
-            <a:off x="457200" y="304800"/>
-            <a:ext cx="5112774" cy="6400800"/>
-          </a:xfrm>
-          <a:prstGeom prst="rect">
-            <a:avLst/>
-          </a:prstGeom>
-          <a:noFill/>
-          <a:ln w="9525">
-            <a:noFill/>
-            <a:miter lim="800000"/>
-            <a:headEnd/>
-            <a:tailEnd/>
-          </a:ln>
-        </p:spPr>
-      </p:pic>
-      <p:cxnSp>
-        <p:nvCxnSpPr>
-          <p:cNvPr id="5" name="Straight Arrow Connector 4"/>
-          <p:cNvCxnSpPr/>
-          <p:nvPr/>
-        </p:nvCxnSpPr>
-        <p:spPr>
-          <a:xfrm rot="10800000">
-            <a:off x="3886200" y="2132011"/>
-            <a:ext cx="838200" cy="1588"/>
-          </a:xfrm>
-          <a:prstGeom prst="straightConnector1">
-            <a:avLst/>
-          </a:prstGeom>
-          <a:ln>
-            <a:tailEnd type="arrow"/>
-          </a:ln>
-        </p:spPr>
-        <p:style>
-          <a:lnRef idx="1">
-            <a:schemeClr val="accent1"/>
-          </a:lnRef>
-          <a:fillRef idx="0">
-            <a:schemeClr val="accent1"/>
-          </a:fillRef>
-          <a:effectRef idx="0">
-            <a:schemeClr val="accent1"/>
-          </a:effectRef>
-          <a:fontRef idx="minor">
-            <a:schemeClr val="tx1"/>
-          </a:fontRef>
-        </p:style>
-      </p:cxnSp>
-      <p:sp>
-        <p:nvSpPr>
-          <p:cNvPr id="6" name="TextBox 5"/>
-          <p:cNvSpPr txBox="1"/>
-          <p:nvPr/>
-        </p:nvSpPr>
-        <p:spPr>
-          <a:xfrm>
-            <a:off x="5410200" y="533400"/>
-            <a:ext cx="2791598" cy="369332"/>
-          </a:xfrm>
-          <a:prstGeom prst="rect">
-            <a:avLst/>
-          </a:prstGeom>
-          <a:noFill/>
-        </p:spPr>
-        <p:txBody>
-          <a:bodyPr wrap="none" rtlCol="0">
-            <a:spAutoFit/>
-          </a:bodyPr>
-          <a:lstStyle/>
-          <a:p>
-            <a:r>
-              <a:rPr lang="en-US" dirty="0"/>
-              <a:t>Our cancellation now works</a:t>
-            </a:r>
-          </a:p>
-        </p:txBody>
-      </p:sp>
-      <p:pic>
-        <p:nvPicPr>
-          <p:cNvPr id="1028" name="Picture 4"/>
-          <p:cNvPicPr>
-            <a:picLocks noChangeAspect="1" noChangeArrowheads="1"/>
-          </p:cNvPicPr>
-          <p:nvPr/>
-        </p:nvPicPr>
-        <p:blipFill>
-          <a:blip r:embed="rId3" cstate="print"/>
-          <a:srcRect/>
-          <a:stretch>
-            <a:fillRect/>
-          </a:stretch>
-        </p:blipFill>
-        <p:spPr bwMode="auto">
-          <a:xfrm>
-            <a:off x="3810000" y="4419600"/>
-            <a:ext cx="5124450" cy="1480594"/>
-          </a:xfrm>
-          <a:prstGeom prst="rect">
-            <a:avLst/>
-          </a:prstGeom>
-          <a:noFill/>
-          <a:ln w="9525">
-            <a:noFill/>
-            <a:miter lim="800000"/>
-            <a:headEnd/>
-            <a:tailEnd/>
-          </a:ln>
-        </p:spPr>
-      </p:pic>
-      <p:sp>
-        <p:nvSpPr>
-          <p:cNvPr id="8" name="TextBox 7"/>
-          <p:cNvSpPr txBox="1"/>
-          <p:nvPr/>
-        </p:nvSpPr>
-        <p:spPr>
-          <a:xfrm>
-            <a:off x="4114800" y="5943600"/>
-            <a:ext cx="4800600" cy="646331"/>
-          </a:xfrm>
-          <a:prstGeom prst="rect">
-            <a:avLst/>
-          </a:prstGeom>
-          <a:noFill/>
-        </p:spPr>
-        <p:txBody>
-          <a:bodyPr wrap="square" rtlCol="0">
-            <a:spAutoFit/>
-          </a:bodyPr>
-          <a:lstStyle/>
-          <a:p>
-            <a:r>
-              <a:rPr lang="en-US" dirty="0"/>
-              <a:t>The thread is successfully cancelled.  “end work” is not reached</a:t>
-            </a:r>
-          </a:p>
-        </p:txBody>
-      </p:sp>
-    </p:spTree>
-  </p:cSld>
-  <p:clrMapOvr>
-    <a:masterClrMapping/>
-  </p:clrMapOvr>
-  <p:timing>
-    <p:tnLst>
-      <p:par>
-        <p:cTn id="1" dur="indefinite" restart="never" nodeType="tmRoot"/>
-      </p:par>
-    </p:tnLst>
-  </p:timing>
-</p:sld>
-</file>
-
-<file path=ppt/slides/slide45.xml><?xml version="1.0" encoding="utf-8"?>
-<p:sld xmlns:a="http://schemas.openxmlformats.org/drawingml/2006/main" xmlns:r="http://schemas.openxmlformats.org/officeDocument/2006/relationships" xmlns:p="http://schemas.openxmlformats.org/presentationml/2006/main">
-  <p:cSld>
-    <p:spTree>
-      <p:nvGrpSpPr>
-        <p:cNvPr id="1" name=""/>
-        <p:cNvGrpSpPr/>
-        <p:nvPr/>
-      </p:nvGrpSpPr>
-      <p:grpSpPr>
-        <a:xfrm>
-          <a:off x="0" y="0"/>
-          <a:ext cx="0" cy="0"/>
-          <a:chOff x="0" y="0"/>
-          <a:chExt cx="0" cy="0"/>
-        </a:xfrm>
-      </p:grpSpPr>
-      <p:pic>
-        <p:nvPicPr>
-          <p:cNvPr id="3074" name="Picture 2"/>
-          <p:cNvPicPr>
-            <a:picLocks noChangeAspect="1" noChangeArrowheads="1"/>
-          </p:cNvPicPr>
-          <p:nvPr/>
-        </p:nvPicPr>
-        <p:blipFill>
-          <a:blip r:embed="rId2" cstate="print"/>
-          <a:srcRect/>
-          <a:stretch>
-            <a:fillRect/>
-          </a:stretch>
-        </p:blipFill>
-        <p:spPr bwMode="auto">
-          <a:xfrm>
-            <a:off x="228600" y="0"/>
-            <a:ext cx="4791075" cy="4000500"/>
-          </a:xfrm>
-          <a:prstGeom prst="rect">
-            <a:avLst/>
-          </a:prstGeom>
-          <a:noFill/>
-          <a:ln w="9525">
-            <a:noFill/>
-            <a:miter lim="800000"/>
-            <a:headEnd/>
-            <a:tailEnd/>
-          </a:ln>
-        </p:spPr>
-      </p:pic>
-      <p:pic>
-        <p:nvPicPr>
-          <p:cNvPr id="3075" name="Picture 3"/>
-          <p:cNvPicPr>
-            <a:picLocks noChangeAspect="1" noChangeArrowheads="1"/>
-          </p:cNvPicPr>
-          <p:nvPr/>
-        </p:nvPicPr>
-        <p:blipFill>
-          <a:blip r:embed="rId3" cstate="print"/>
-          <a:srcRect/>
-          <a:stretch>
-            <a:fillRect/>
-          </a:stretch>
-        </p:blipFill>
-        <p:spPr bwMode="auto">
-          <a:xfrm>
-            <a:off x="457200" y="4191000"/>
-            <a:ext cx="3947448" cy="2438400"/>
-          </a:xfrm>
-          <a:prstGeom prst="rect">
-            <a:avLst/>
-          </a:prstGeom>
-          <a:noFill/>
-          <a:ln w="9525">
-            <a:noFill/>
-            <a:miter lim="800000"/>
-            <a:headEnd/>
-            <a:tailEnd/>
-          </a:ln>
-        </p:spPr>
-      </p:pic>
-      <p:sp>
-        <p:nvSpPr>
-          <p:cNvPr id="7" name="TextBox 6"/>
-          <p:cNvSpPr txBox="1"/>
-          <p:nvPr/>
-        </p:nvSpPr>
-        <p:spPr>
-          <a:xfrm>
-            <a:off x="4800600" y="762000"/>
-            <a:ext cx="3834961" cy="646331"/>
-          </a:xfrm>
-          <a:prstGeom prst="rect">
-            <a:avLst/>
-          </a:prstGeom>
-          <a:noFill/>
-        </p:spPr>
-        <p:txBody>
-          <a:bodyPr wrap="none" rtlCol="0">
-            <a:spAutoFit/>
-          </a:bodyPr>
-          <a:lstStyle/>
-          <a:p>
-            <a:r>
-              <a:rPr lang="en-US" dirty="0"/>
-              <a:t>If we throw a normal</a:t>
-            </a:r>
-          </a:p>
-          <a:p>
-            <a:r>
-              <a:rPr lang="en-US" dirty="0"/>
-              <a:t>Exception (not </a:t>
-            </a:r>
-            <a:r>
-              <a:rPr lang="en-US" dirty="0" err="1"/>
-              <a:t>InterruptedException</a:t>
-            </a:r>
-            <a:r>
-              <a:rPr lang="en-US" dirty="0"/>
-              <a:t>)…</a:t>
-            </a:r>
-          </a:p>
-        </p:txBody>
-      </p:sp>
-      <p:cxnSp>
-        <p:nvCxnSpPr>
-          <p:cNvPr id="9" name="Straight Arrow Connector 8"/>
-          <p:cNvCxnSpPr/>
-          <p:nvPr/>
-        </p:nvCxnSpPr>
-        <p:spPr>
-          <a:xfrm rot="10800000">
-            <a:off x="2971800" y="6400800"/>
-            <a:ext cx="609600" cy="1588"/>
-          </a:xfrm>
-          <a:prstGeom prst="straightConnector1">
-            <a:avLst/>
-          </a:prstGeom>
-          <a:ln>
-            <a:tailEnd type="arrow"/>
-          </a:ln>
-        </p:spPr>
-        <p:style>
-          <a:lnRef idx="1">
-            <a:schemeClr val="accent1"/>
-          </a:lnRef>
-          <a:fillRef idx="0">
-            <a:schemeClr val="accent1"/>
-          </a:fillRef>
-          <a:effectRef idx="0">
-            <a:schemeClr val="accent1"/>
-          </a:effectRef>
-          <a:fontRef idx="minor">
-            <a:schemeClr val="tx1"/>
-          </a:fontRef>
-        </p:style>
-      </p:cxnSp>
-      <p:sp>
-        <p:nvSpPr>
-          <p:cNvPr id="10" name="TextBox 9"/>
-          <p:cNvSpPr txBox="1"/>
-          <p:nvPr/>
-        </p:nvSpPr>
-        <p:spPr>
-          <a:xfrm>
-            <a:off x="3657600" y="6248400"/>
-            <a:ext cx="4114800" cy="369332"/>
-          </a:xfrm>
-          <a:prstGeom prst="rect">
-            <a:avLst/>
-          </a:prstGeom>
-          <a:noFill/>
-        </p:spPr>
-        <p:txBody>
-          <a:bodyPr wrap="square" rtlCol="0">
-            <a:spAutoFit/>
-          </a:bodyPr>
-          <a:lstStyle/>
-          <a:p>
-            <a:r>
-              <a:rPr lang="en-US" dirty="0"/>
-              <a:t>Then get re-throws </a:t>
-            </a:r>
-            <a:r>
-              <a:rPr lang="en-US"/>
-              <a:t>that Exception   </a:t>
-            </a:r>
-            <a:endParaRPr lang="en-US" dirty="0"/>
-          </a:p>
-        </p:txBody>
-      </p:sp>
-      <p:pic>
-        <p:nvPicPr>
-          <p:cNvPr id="3076" name="Picture 4"/>
-          <p:cNvPicPr>
-            <a:picLocks noChangeAspect="1" noChangeArrowheads="1"/>
-          </p:cNvPicPr>
-          <p:nvPr/>
-        </p:nvPicPr>
-        <p:blipFill>
-          <a:blip r:embed="rId4" cstate="print"/>
-          <a:srcRect/>
-          <a:stretch>
-            <a:fillRect/>
-          </a:stretch>
-        </p:blipFill>
-        <p:spPr bwMode="auto">
-          <a:xfrm>
-            <a:off x="3954483" y="4419600"/>
-            <a:ext cx="5189517" cy="1752600"/>
-          </a:xfrm>
-          <a:prstGeom prst="rect">
-            <a:avLst/>
-          </a:prstGeom>
-          <a:noFill/>
-          <a:ln w="9525">
-            <a:noFill/>
-            <a:miter lim="800000"/>
-            <a:headEnd/>
-            <a:tailEnd/>
-          </a:ln>
-        </p:spPr>
-      </p:pic>
-    </p:spTree>
-  </p:cSld>
-  <p:clrMapOvr>
-    <a:masterClrMapping/>
-  </p:clrMapOvr>
-  <p:timing>
-    <p:tnLst>
-      <p:par>
-        <p:cTn id="1" dur="indefinite" restart="never" nodeType="tmRoot"/>
-      </p:par>
-    </p:tnLst>
-  </p:timing>
-</p:sld>
-</file>
-
-<file path=ppt/slides/slide46.xml><?xml version="1.0" encoding="utf-8"?>
-<p:sld xmlns:a="http://schemas.openxmlformats.org/drawingml/2006/main" xmlns:r="http://schemas.openxmlformats.org/officeDocument/2006/relationships" xmlns:p="http://schemas.openxmlformats.org/presentationml/2006/main">
-  <p:cSld>
-    <p:spTree>
-      <p:nvGrpSpPr>
-        <p:cNvPr id="1" name=""/>
-        <p:cNvGrpSpPr/>
-        <p:nvPr/>
-      </p:nvGrpSpPr>
-      <p:grpSpPr>
-        <a:xfrm>
-          <a:off x="0" y="0"/>
-          <a:ext cx="0" cy="0"/>
-          <a:chOff x="0" y="0"/>
-          <a:chExt cx="0" cy="0"/>
-        </a:xfrm>
-      </p:grpSpPr>
       <p:sp>
         <p:nvSpPr>
           <p:cNvPr id="4" name="TextBox 3"/>
@@ -10325,13 +9694,6 @@
   <p:clrMapOvr>
     <a:masterClrMapping/>
   </p:clrMapOvr>
-  <p:timing>
-    <p:tnLst>
-      <p:par>
-        <p:cTn id="1" dur="indefinite" restart="never" nodeType="tmRoot"/>
-      </p:par>
-    </p:tnLst>
-  </p:timing>
 </p:sld>
 </file>
 
@@ -10498,13 +9860,6 @@
   <p:clrMapOvr>
     <a:masterClrMapping/>
   </p:clrMapOvr>
-  <p:timing>
-    <p:tnLst>
-      <p:par>
-        <p:cTn id="1" dur="indefinite" restart="never" nodeType="tmRoot"/>
-      </p:par>
-    </p:tnLst>
-  </p:timing>
 </p:sld>
 </file>
 
@@ -10632,13 +9987,6 @@
   <p:clrMapOvr>
     <a:masterClrMapping/>
   </p:clrMapOvr>
-  <p:timing>
-    <p:tnLst>
-      <p:par>
-        <p:cTn id="1" dur="indefinite" restart="never" nodeType="tmRoot"/>
-      </p:par>
-    </p:tnLst>
-  </p:timing>
 </p:sld>
 </file>
 
@@ -10754,13 +10102,6 @@
   <p:clrMapOvr>
     <a:masterClrMapping/>
   </p:clrMapOvr>
-  <p:timing>
-    <p:tnLst>
-      <p:par>
-        <p:cTn id="1" dur="indefinite" restart="never" nodeType="tmRoot"/>
-      </p:par>
-    </p:tnLst>
-  </p:timing>
 </p:sld>
 </file>
 
@@ -10902,13 +10243,6 @@
   <p:clrMapOvr>
     <a:masterClrMapping/>
   </p:clrMapOvr>
-  <p:timing>
-    <p:tnLst>
-      <p:par>
-        <p:cTn id="1" dur="indefinite" restart="never" nodeType="tmRoot"/>
-      </p:par>
-    </p:tnLst>
-  </p:timing>
 </p:sld>
 </file>
 
@@ -11046,13 +10380,6 @@
   <p:clrMapOvr>
     <a:masterClrMapping/>
   </p:clrMapOvr>
-  <p:timing>
-    <p:tnLst>
-      <p:par>
-        <p:cTn id="1" dur="indefinite" restart="never" nodeType="tmRoot"/>
-      </p:par>
-    </p:tnLst>
-  </p:timing>
 </p:sld>
 </file>
 

</xml_diff>